<commit_message>
Included stats.mode() in slides
</commit_message>
<xml_diff>
--- a/presentation.pptx
+++ b/presentation.pptx
@@ -24,6 +24,9 @@
     <p:sldId id="271" r:id="rId19"/>
     <p:sldId id="272" r:id="rId20"/>
     <p:sldId id="273" r:id="rId21"/>
+    <p:sldId id="274" r:id="rId22"/>
+    <p:sldId id="275" r:id="rId23"/>
+    <p:sldId id="276" r:id="rId24"/>
   </p:sldIdLst>
   <p:sldSz cx="12192000" cy="6858000"/>
   <p:notesSz cx="7559675" cy="10691812"/>
@@ -2382,8 +2385,8 @@
         </p:nvSpPr>
         <p:spPr>
           <a:xfrm>
-            <a:off x="838080" y="365040"/>
-            <a:ext cx="10514880" cy="1325160"/>
+            <a:off x="609480" y="273600"/>
+            <a:ext cx="10972080" cy="1144800"/>
           </a:xfrm>
           <a:prstGeom prst="rect">
             <a:avLst/>
@@ -2415,7 +2418,7 @@
         <p:spPr>
           <a:xfrm>
             <a:off x="609480" y="1604520"/>
-            <a:ext cx="10972440" cy="3977280"/>
+            <a:ext cx="10972080" cy="3976920"/>
           </a:xfrm>
           <a:prstGeom prst="rect">
             <a:avLst/>
@@ -2430,7 +2433,7 @@
               <a:buChar char=""/>
             </a:pPr>
             <a:r>
-              <a:rPr lang="en-US" sz="3200">
+              <a:rPr lang="en-US">
                 <a:latin typeface="Arial"/>
               </a:rPr>
               <a:t>Click to edit the outline text format</a:t>
@@ -2444,7 +2447,7 @@
               <a:buChar char=""/>
             </a:pPr>
             <a:r>
-              <a:rPr lang="en-US" sz="2800">
+              <a:rPr lang="en-US">
                 <a:latin typeface="Arial"/>
               </a:rPr>
               <a:t>Second Outline Level</a:t>
@@ -2458,7 +2461,7 @@
               <a:buChar char=""/>
             </a:pPr>
             <a:r>
-              <a:rPr lang="en-US" sz="2400">
+              <a:rPr lang="en-US">
                 <a:latin typeface="Arial"/>
               </a:rPr>
               <a:t>Third Outline Level</a:t>
@@ -2472,7 +2475,7 @@
               <a:buChar char=""/>
             </a:pPr>
             <a:r>
-              <a:rPr lang="en-US" sz="2000">
+              <a:rPr lang="en-US">
                 <a:latin typeface="Arial"/>
               </a:rPr>
               <a:t>Fourth Outline Level</a:t>
@@ -2486,7 +2489,7 @@
               <a:buChar char=""/>
             </a:pPr>
             <a:r>
-              <a:rPr lang="en-US" sz="2000">
+              <a:rPr lang="en-US">
                 <a:latin typeface="Arial"/>
               </a:rPr>
               <a:t>Fifth Outline Level</a:t>
@@ -2500,7 +2503,7 @@
               <a:buChar char=""/>
             </a:pPr>
             <a:r>
-              <a:rPr lang="en-US" sz="2000">
+              <a:rPr lang="en-US">
                 <a:latin typeface="Arial"/>
               </a:rPr>
               <a:t>Sixth Outline Level</a:t>
@@ -2514,7 +2517,7 @@
               <a:buChar char=""/>
             </a:pPr>
             <a:r>
-              <a:rPr lang="en-US" sz="2000">
+              <a:rPr lang="en-US">
                 <a:latin typeface="Arial"/>
               </a:rPr>
               <a:t>Seventh Outline Level</a:t>
@@ -2767,7 +2770,7 @@
         <p:spPr>
           <a:xfrm>
             <a:off x="1523880" y="1122480"/>
-            <a:ext cx="9143280" cy="2386800"/>
+            <a:ext cx="9142920" cy="2386440"/>
           </a:xfrm>
           <a:prstGeom prst="rect">
             <a:avLst/>
@@ -2856,7 +2859,7 @@
         <p:spPr>
           <a:xfrm>
             <a:off x="838080" y="365040"/>
-            <a:ext cx="10514880" cy="1324800"/>
+            <a:ext cx="10514520" cy="1324440"/>
           </a:xfrm>
           <a:prstGeom prst="rect">
             <a:avLst/>
@@ -2896,7 +2899,7 @@
         <p:spPr>
           <a:xfrm>
             <a:off x="838080" y="1825560"/>
-            <a:ext cx="10514880" cy="4350600"/>
+            <a:ext cx="10514520" cy="4350240"/>
           </a:xfrm>
           <a:prstGeom prst="rect">
             <a:avLst/>
@@ -3058,7 +3061,7 @@
         <p:spPr>
           <a:xfrm>
             <a:off x="838080" y="365040"/>
-            <a:ext cx="10514880" cy="1324800"/>
+            <a:ext cx="10514520" cy="1324440"/>
           </a:xfrm>
           <a:prstGeom prst="rect">
             <a:avLst/>
@@ -3098,7 +3101,7 @@
         <p:spPr>
           <a:xfrm>
             <a:off x="838080" y="1825560"/>
-            <a:ext cx="10514880" cy="4350600"/>
+            <a:ext cx="10514520" cy="4350240"/>
           </a:xfrm>
           <a:prstGeom prst="rect">
             <a:avLst/>
@@ -3246,7 +3249,7 @@
         <p:spPr>
           <a:xfrm>
             <a:off x="838080" y="365040"/>
-            <a:ext cx="10514880" cy="1324800"/>
+            <a:ext cx="10514520" cy="1324440"/>
           </a:xfrm>
           <a:prstGeom prst="rect">
             <a:avLst/>
@@ -3286,7 +3289,7 @@
         <p:spPr>
           <a:xfrm>
             <a:off x="838080" y="1825560"/>
-            <a:ext cx="10514880" cy="4350600"/>
+            <a:ext cx="10514520" cy="4350240"/>
           </a:xfrm>
           <a:prstGeom prst="rect">
             <a:avLst/>
@@ -3474,7 +3477,7 @@
         <p:spPr>
           <a:xfrm>
             <a:off x="838080" y="365040"/>
-            <a:ext cx="10514880" cy="1324800"/>
+            <a:ext cx="10514520" cy="1324440"/>
           </a:xfrm>
           <a:prstGeom prst="rect">
             <a:avLst/>
@@ -3514,7 +3517,7 @@
         <p:spPr>
           <a:xfrm>
             <a:off x="838080" y="1825560"/>
-            <a:ext cx="10514880" cy="4350600"/>
+            <a:ext cx="10514520" cy="4350240"/>
           </a:xfrm>
           <a:prstGeom prst="rect">
             <a:avLst/>
@@ -3653,7 +3656,7 @@
         <p:spPr>
           <a:xfrm>
             <a:off x="838080" y="365040"/>
-            <a:ext cx="10514880" cy="1324800"/>
+            <a:ext cx="10514520" cy="1324440"/>
           </a:xfrm>
           <a:prstGeom prst="rect">
             <a:avLst/>
@@ -3693,7 +3696,7 @@
         <p:spPr>
           <a:xfrm>
             <a:off x="838080" y="1825560"/>
-            <a:ext cx="10514880" cy="4350600"/>
+            <a:ext cx="10514520" cy="4350240"/>
           </a:xfrm>
           <a:prstGeom prst="rect">
             <a:avLst/>
@@ -3795,16 +3798,14 @@
                 <a:spcPct val="100000"/>
               </a:lnSpc>
             </a:pPr>
-            <a:r>
-              <a:rPr lang="en-US" sz="2800">
-                <a:solidFill>
-                  <a:srgbClr val="000000"/>
-                </a:solidFill>
-                <a:latin typeface="Calibri light"/>
-              </a:rPr>
-              <a:t>
-</a:t>
-            </a:r>
+            <a:endParaRPr/>
+          </a:p>
+          <a:p>
+            <a:pPr>
+              <a:lnSpc>
+                <a:spcPct val="100000"/>
+              </a:lnSpc>
+            </a:pPr>
             <a:endParaRPr/>
           </a:p>
           <a:p>
@@ -3883,7 +3884,7 @@
         <p:spPr>
           <a:xfrm>
             <a:off x="838080" y="365040"/>
-            <a:ext cx="10514880" cy="1324800"/>
+            <a:ext cx="10514520" cy="1324440"/>
           </a:xfrm>
           <a:prstGeom prst="rect">
             <a:avLst/>
@@ -3923,7 +3924,7 @@
         <p:spPr>
           <a:xfrm>
             <a:off x="838080" y="1825560"/>
-            <a:ext cx="10514880" cy="4350600"/>
+            <a:ext cx="10514520" cy="4350240"/>
           </a:xfrm>
           <a:prstGeom prst="rect">
             <a:avLst/>
@@ -4085,16 +4086,14 @@
                 <a:spcPct val="100000"/>
               </a:lnSpc>
             </a:pPr>
-            <a:r>
-              <a:rPr lang="en-US" sz="2800">
-                <a:solidFill>
-                  <a:srgbClr val="000000"/>
-                </a:solidFill>
-                <a:latin typeface="Calibri light"/>
-              </a:rPr>
-              <a:t>
-</a:t>
-            </a:r>
+            <a:endParaRPr/>
+          </a:p>
+          <a:p>
+            <a:pPr>
+              <a:lnSpc>
+                <a:spcPct val="100000"/>
+              </a:lnSpc>
+            </a:pPr>
             <a:endParaRPr/>
           </a:p>
           <a:p>
@@ -4173,7 +4172,7 @@
         <p:spPr>
           <a:xfrm>
             <a:off x="838080" y="365040"/>
-            <a:ext cx="10514880" cy="1324800"/>
+            <a:ext cx="10514520" cy="1324440"/>
           </a:xfrm>
           <a:prstGeom prst="rect">
             <a:avLst/>
@@ -4213,7 +4212,7 @@
         <p:spPr>
           <a:xfrm>
             <a:off x="838080" y="1825560"/>
-            <a:ext cx="10514880" cy="4350600"/>
+            <a:ext cx="10514520" cy="4350240"/>
           </a:xfrm>
           <a:prstGeom prst="rect">
             <a:avLst/>
@@ -4281,16 +4280,14 @@
                 <a:spcPct val="100000"/>
               </a:lnSpc>
             </a:pPr>
-            <a:r>
-              <a:rPr lang="en-US" sz="2800">
-                <a:solidFill>
-                  <a:srgbClr val="000000"/>
-                </a:solidFill>
-                <a:latin typeface="Calibri light"/>
-              </a:rPr>
-              <a:t>
-</a:t>
-            </a:r>
+            <a:endParaRPr/>
+          </a:p>
+          <a:p>
+            <a:pPr>
+              <a:lnSpc>
+                <a:spcPct val="100000"/>
+              </a:lnSpc>
+            </a:pPr>
             <a:endParaRPr/>
           </a:p>
           <a:p>
@@ -4369,7 +4366,7 @@
         <p:spPr>
           <a:xfrm>
             <a:off x="838080" y="365040"/>
-            <a:ext cx="10514880" cy="1324800"/>
+            <a:ext cx="10514520" cy="1324440"/>
           </a:xfrm>
           <a:prstGeom prst="rect">
             <a:avLst/>
@@ -4409,7 +4406,7 @@
         <p:spPr>
           <a:xfrm>
             <a:off x="838080" y="1825560"/>
-            <a:ext cx="10514880" cy="4350600"/>
+            <a:ext cx="10514520" cy="4350240"/>
           </a:xfrm>
           <a:prstGeom prst="rect">
             <a:avLst/>
@@ -4477,16 +4474,14 @@
                 <a:spcPct val="100000"/>
               </a:lnSpc>
             </a:pPr>
-            <a:r>
-              <a:rPr lang="en-US" sz="2800">
-                <a:solidFill>
-                  <a:srgbClr val="000000"/>
-                </a:solidFill>
-                <a:latin typeface="Calibri light"/>
-              </a:rPr>
-              <a:t>
-</a:t>
-            </a:r>
+            <a:endParaRPr/>
+          </a:p>
+          <a:p>
+            <a:pPr>
+              <a:lnSpc>
+                <a:spcPct val="100000"/>
+              </a:lnSpc>
+            </a:pPr>
             <a:endParaRPr/>
           </a:p>
           <a:p>
@@ -4565,7 +4560,7 @@
         <p:spPr>
           <a:xfrm>
             <a:off x="838080" y="365040"/>
-            <a:ext cx="10514880" cy="1324800"/>
+            <a:ext cx="10514520" cy="1324440"/>
           </a:xfrm>
           <a:prstGeom prst="rect">
             <a:avLst/>
@@ -4605,7 +4600,7 @@
         <p:spPr>
           <a:xfrm>
             <a:off x="838080" y="1825560"/>
-            <a:ext cx="10514880" cy="4350600"/>
+            <a:ext cx="10514520" cy="4350240"/>
           </a:xfrm>
           <a:prstGeom prst="rect">
             <a:avLst/>
@@ -4655,7 +4650,7 @@
                 </a:solidFill>
                 <a:latin typeface="Lucida Console"/>
               </a:rPr>
-              <a:t>A função stats.mode() </a:t>
+              <a:t>Para obter a moda, podemos utilizar o método stats.mode(), fornecido pelo pacote SciPy</a:t>
             </a:r>
             <a:endParaRPr/>
           </a:p>
@@ -4670,6 +4665,202 @@
           <p:childTnLst>
             <p:seq>
               <p:cTn id="36" nodeType="mainSeq"/>
+              <p:prevCondLst>
+                <p:cond delay="0" evt="onPrev">
+                  <p:tgtEl>
+                    <p:sldTgt/>
+                  </p:tgtEl>
+                </p:cond>
+              </p:prevCondLst>
+              <p:nextCondLst>
+                <p:cond delay="0" evt="onNext">
+                  <p:tgtEl>
+                    <p:sldTgt/>
+                  </p:tgtEl>
+                </p:cond>
+              </p:nextCondLst>
+            </p:seq>
+          </p:childTnLst>
+        </p:cTn>
+      </p:par>
+    </p:tnLst>
+  </p:timing>
+</p:sld>
+</file>
+
+<file path=ppt/slides/slide19.xml><?xml version="1.0" encoding="utf-8"?>
+<p:sld xmlns:a="http://schemas.openxmlformats.org/drawingml/2006/main" xmlns:p="http://schemas.openxmlformats.org/presentationml/2006/main" xmlns:r="http://schemas.openxmlformats.org/officeDocument/2006/relationships">
+  <p:cSld>
+    <p:spTree>
+      <p:nvGrpSpPr>
+        <p:cNvPr id="1" name=""/>
+        <p:cNvGrpSpPr/>
+        <p:nvPr/>
+      </p:nvGrpSpPr>
+      <p:grpSpPr>
+        <a:xfrm>
+          <a:off x="0" y="0"/>
+          <a:ext cx="0" cy="0"/>
+          <a:chOff x="0" y="0"/>
+          <a:chExt cx="0" cy="0"/>
+        </a:xfrm>
+      </p:grpSpPr>
+      <p:sp>
+        <p:nvSpPr>
+          <p:cNvPr id="108" name="CustomShape 1"/>
+          <p:cNvSpPr/>
+          <p:nvPr/>
+        </p:nvSpPr>
+        <p:spPr>
+          <a:xfrm>
+            <a:off x="838080" y="365040"/>
+            <a:ext cx="10514520" cy="1324440"/>
+          </a:xfrm>
+          <a:prstGeom prst="rect">
+            <a:avLst/>
+          </a:prstGeom>
+          <a:noFill/>
+          <a:ln>
+            <a:noFill/>
+          </a:ln>
+        </p:spPr>
+        <p:txBody>
+          <a:bodyPr lIns="90000" rIns="90000" tIns="45000" bIns="45000" anchor="ctr"/>
+          <a:p>
+            <a:pPr>
+              <a:lnSpc>
+                <a:spcPct val="90000"/>
+              </a:lnSpc>
+            </a:pPr>
+            <a:r>
+              <a:rPr lang="en-US" sz="4400">
+                <a:solidFill>
+                  <a:srgbClr val="000000"/>
+                </a:solidFill>
+                <a:latin typeface="Calibri Light"/>
+              </a:rPr>
+              <a:t>Moda</a:t>
+            </a:r>
+            <a:endParaRPr/>
+          </a:p>
+        </p:txBody>
+      </p:sp>
+      <p:sp>
+        <p:nvSpPr>
+          <p:cNvPr id="109" name="CustomShape 2"/>
+          <p:cNvSpPr/>
+          <p:nvPr/>
+        </p:nvSpPr>
+        <p:spPr>
+          <a:xfrm>
+            <a:off x="838080" y="1825560"/>
+            <a:ext cx="10514520" cy="4350240"/>
+          </a:xfrm>
+          <a:prstGeom prst="rect">
+            <a:avLst/>
+          </a:prstGeom>
+          <a:noFill/>
+          <a:ln>
+            <a:noFill/>
+          </a:ln>
+        </p:spPr>
+        <p:txBody>
+          <a:bodyPr lIns="90000" rIns="90000" tIns="45000" bIns="45000"/>
+          <a:p>
+            <a:pPr>
+              <a:lnSpc>
+                <a:spcPct val="100000"/>
+              </a:lnSpc>
+            </a:pPr>
+            <a:r>
+              <a:rPr lang="en-US" sz="2800">
+                <a:solidFill>
+                  <a:srgbClr val="385623"/>
+                </a:solidFill>
+                <a:latin typeface="Lucida Console"/>
+              </a:rPr>
+              <a:t>from scipy import stats</a:t>
+            </a:r>
+            <a:endParaRPr/>
+          </a:p>
+          <a:p>
+            <a:pPr>
+              <a:lnSpc>
+                <a:spcPct val="100000"/>
+              </a:lnSpc>
+            </a:pPr>
+            <a:endParaRPr/>
+          </a:p>
+          <a:p>
+            <a:pPr>
+              <a:lnSpc>
+                <a:spcPct val="100000"/>
+              </a:lnSpc>
+            </a:pPr>
+            <a:r>
+              <a:rPr lang="en-US" sz="2800">
+                <a:solidFill>
+                  <a:srgbClr val="385623"/>
+                </a:solidFill>
+                <a:latin typeface="Lucida Console"/>
+              </a:rPr>
+              <a:t>numeros = [20, 20, 1000, 50, 20, 1000]</a:t>
+            </a:r>
+            <a:endParaRPr/>
+          </a:p>
+          <a:p>
+            <a:pPr>
+              <a:lnSpc>
+                <a:spcPct val="100000"/>
+              </a:lnSpc>
+            </a:pPr>
+            <a:r>
+              <a:rPr lang="en-US" sz="2800">
+                <a:solidFill>
+                  <a:srgbClr val="385623"/>
+                </a:solidFill>
+                <a:latin typeface="Lucida Console"/>
+              </a:rPr>
+              <a:t>stats.mode(numeros)</a:t>
+            </a:r>
+            <a:endParaRPr/>
+          </a:p>
+          <a:p>
+            <a:pPr>
+              <a:lnSpc>
+                <a:spcPct val="100000"/>
+              </a:lnSpc>
+            </a:pPr>
+            <a:endParaRPr/>
+          </a:p>
+          <a:p>
+            <a:pPr>
+              <a:lnSpc>
+                <a:spcPct val="100000"/>
+              </a:lnSpc>
+            </a:pPr>
+            <a:r>
+              <a:rPr lang="en-US" sz="2800">
+                <a:solidFill>
+                  <a:srgbClr val="385623"/>
+                </a:solidFill>
+                <a:latin typeface="Lucida Console"/>
+              </a:rPr>
+              <a:t>ModeResult(mode=array([20]), count=array([3]))</a:t>
+            </a:r>
+            <a:endParaRPr/>
+          </a:p>
+        </p:txBody>
+      </p:sp>
+    </p:spTree>
+  </p:cSld>
+  <p:timing>
+    <p:tnLst>
+      <p:par>
+        <p:cTn id="37" dur="indefinite" restart="never" nodeType="tmRoot">
+          <p:childTnLst>
+            <p:seq>
+              <p:cTn id="38" nodeType="mainSeq"/>
               <p:prevCondLst>
                 <p:cond delay="0" evt="onPrev">
                   <p:tgtEl>
@@ -4719,7 +4910,7 @@
         <p:spPr>
           <a:xfrm>
             <a:off x="838080" y="365040"/>
-            <a:ext cx="10514880" cy="1324800"/>
+            <a:ext cx="10514520" cy="1324440"/>
           </a:xfrm>
           <a:prstGeom prst="rect">
             <a:avLst/>
@@ -4759,7 +4950,7 @@
         <p:spPr>
           <a:xfrm>
             <a:off x="838080" y="1825560"/>
-            <a:ext cx="10514880" cy="2473920"/>
+            <a:ext cx="10514520" cy="2473560"/>
           </a:xfrm>
           <a:prstGeom prst="rect">
             <a:avLst/>
@@ -4871,7 +5062,7 @@
         <p:spPr>
           <a:xfrm>
             <a:off x="1270800" y="4628160"/>
-            <a:ext cx="9649800" cy="1407960"/>
+            <a:ext cx="9649440" cy="1407600"/>
           </a:xfrm>
           <a:prstGeom prst="roundRect">
             <a:avLst>
@@ -4989,6 +5180,347 @@
           <p:childTnLst>
             <p:seq>
               <p:cTn id="4" nodeType="mainSeq"/>
+              <p:prevCondLst>
+                <p:cond delay="0" evt="onPrev">
+                  <p:tgtEl>
+                    <p:sldTgt/>
+                  </p:tgtEl>
+                </p:cond>
+              </p:prevCondLst>
+              <p:nextCondLst>
+                <p:cond delay="0" evt="onNext">
+                  <p:tgtEl>
+                    <p:sldTgt/>
+                  </p:tgtEl>
+                </p:cond>
+              </p:nextCondLst>
+            </p:seq>
+          </p:childTnLst>
+        </p:cTn>
+      </p:par>
+    </p:tnLst>
+  </p:timing>
+</p:sld>
+</file>
+
+<file path=ppt/slides/slide20.xml><?xml version="1.0" encoding="utf-8"?>
+<p:sld xmlns:a="http://schemas.openxmlformats.org/drawingml/2006/main" xmlns:p="http://schemas.openxmlformats.org/presentationml/2006/main" xmlns:r="http://schemas.openxmlformats.org/officeDocument/2006/relationships">
+  <p:cSld>
+    <p:spTree>
+      <p:nvGrpSpPr>
+        <p:cNvPr id="1" name=""/>
+        <p:cNvGrpSpPr/>
+        <p:nvPr/>
+      </p:nvGrpSpPr>
+      <p:grpSpPr>
+        <a:xfrm>
+          <a:off x="0" y="0"/>
+          <a:ext cx="0" cy="0"/>
+          <a:chOff x="0" y="0"/>
+          <a:chExt cx="0" cy="0"/>
+        </a:xfrm>
+      </p:grpSpPr>
+      <p:sp>
+        <p:nvSpPr>
+          <p:cNvPr id="110" name="CustomShape 1"/>
+          <p:cNvSpPr/>
+          <p:nvPr/>
+        </p:nvSpPr>
+        <p:spPr>
+          <a:xfrm>
+            <a:off x="838080" y="365040"/>
+            <a:ext cx="10514520" cy="1324440"/>
+          </a:xfrm>
+          <a:prstGeom prst="rect">
+            <a:avLst/>
+          </a:prstGeom>
+          <a:noFill/>
+          <a:ln>
+            <a:noFill/>
+          </a:ln>
+        </p:spPr>
+        <p:txBody>
+          <a:bodyPr lIns="90000" rIns="90000" tIns="45000" bIns="45000" anchor="ctr"/>
+          <a:p>
+            <a:pPr>
+              <a:lnSpc>
+                <a:spcPct val="90000"/>
+              </a:lnSpc>
+            </a:pPr>
+            <a:r>
+              <a:rPr lang="en-US" sz="4400">
+                <a:solidFill>
+                  <a:srgbClr val="000000"/>
+                </a:solidFill>
+                <a:latin typeface="Calibri Light"/>
+              </a:rPr>
+              <a:t>Moda</a:t>
+            </a:r>
+            <a:endParaRPr/>
+          </a:p>
+        </p:txBody>
+      </p:sp>
+      <p:sp>
+        <p:nvSpPr>
+          <p:cNvPr id="111" name="CustomShape 2"/>
+          <p:cNvSpPr/>
+          <p:nvPr/>
+        </p:nvSpPr>
+        <p:spPr>
+          <a:xfrm>
+            <a:off x="838080" y="1825560"/>
+            <a:ext cx="10514520" cy="4350240"/>
+          </a:xfrm>
+          <a:prstGeom prst="rect">
+            <a:avLst/>
+          </a:prstGeom>
+          <a:noFill/>
+          <a:ln>
+            <a:noFill/>
+          </a:ln>
+        </p:spPr>
+        <p:txBody>
+          <a:bodyPr lIns="90000" rIns="90000" tIns="45000" bIns="45000"/>
+          <a:p>
+            <a:pPr>
+              <a:lnSpc>
+                <a:spcPct val="100000"/>
+              </a:lnSpc>
+            </a:pPr>
+            <a:endParaRPr/>
+          </a:p>
+          <a:p>
+            <a:pPr>
+              <a:lnSpc>
+                <a:spcPct val="100000"/>
+              </a:lnSpc>
+            </a:pPr>
+            <a:r>
+              <a:rPr lang="en-US" sz="2800">
+                <a:solidFill>
+                  <a:srgbClr val="385623"/>
+                </a:solidFill>
+                <a:latin typeface="Lucida Console"/>
+              </a:rPr>
+              <a:t>stats.mode(numeros)[0]</a:t>
+            </a:r>
+            <a:endParaRPr/>
+          </a:p>
+          <a:p>
+            <a:pPr>
+              <a:lnSpc>
+                <a:spcPct val="100000"/>
+              </a:lnSpc>
+            </a:pPr>
+            <a:endParaRPr/>
+          </a:p>
+          <a:p>
+            <a:pPr>
+              <a:lnSpc>
+                <a:spcPct val="100000"/>
+              </a:lnSpc>
+            </a:pPr>
+            <a:r>
+              <a:rPr lang="en-US" sz="2800">
+                <a:solidFill>
+                  <a:srgbClr val="385623"/>
+                </a:solidFill>
+                <a:latin typeface="Lucida Console"/>
+              </a:rPr>
+              <a:t>array([20])</a:t>
+            </a:r>
+            <a:endParaRPr/>
+          </a:p>
+          <a:p>
+            <a:pPr>
+              <a:lnSpc>
+                <a:spcPct val="100000"/>
+              </a:lnSpc>
+            </a:pPr>
+            <a:endParaRPr/>
+          </a:p>
+          <a:p>
+            <a:pPr>
+              <a:lnSpc>
+                <a:spcPct val="100000"/>
+              </a:lnSpc>
+            </a:pPr>
+            <a:r>
+              <a:rPr lang="en-US" sz="2800">
+                <a:solidFill>
+                  <a:srgbClr val="385623"/>
+                </a:solidFill>
+                <a:latin typeface="Lucida Console"/>
+              </a:rPr>
+              <a:t>stats.mode(numeros)[0][0]</a:t>
+            </a:r>
+            <a:endParaRPr/>
+          </a:p>
+          <a:p>
+            <a:pPr>
+              <a:lnSpc>
+                <a:spcPct val="100000"/>
+              </a:lnSpc>
+            </a:pPr>
+            <a:r>
+              <a:rPr lang="en-US" sz="2800">
+                <a:solidFill>
+                  <a:srgbClr val="385623"/>
+                </a:solidFill>
+                <a:latin typeface="Lucida Console"/>
+              </a:rPr>
+              <a:t>20</a:t>
+            </a:r>
+            <a:endParaRPr/>
+          </a:p>
+        </p:txBody>
+      </p:sp>
+    </p:spTree>
+  </p:cSld>
+  <p:timing>
+    <p:tnLst>
+      <p:par>
+        <p:cTn id="39" dur="indefinite" restart="never" nodeType="tmRoot">
+          <p:childTnLst>
+            <p:seq>
+              <p:cTn id="40" nodeType="mainSeq"/>
+              <p:prevCondLst>
+                <p:cond delay="0" evt="onPrev">
+                  <p:tgtEl>
+                    <p:sldTgt/>
+                  </p:tgtEl>
+                </p:cond>
+              </p:prevCondLst>
+              <p:nextCondLst>
+                <p:cond delay="0" evt="onNext">
+                  <p:tgtEl>
+                    <p:sldTgt/>
+                  </p:tgtEl>
+                </p:cond>
+              </p:nextCondLst>
+            </p:seq>
+          </p:childTnLst>
+        </p:cTn>
+      </p:par>
+    </p:tnLst>
+  </p:timing>
+</p:sld>
+</file>
+
+<file path=ppt/slides/slide21.xml><?xml version="1.0" encoding="utf-8"?>
+<p:sld xmlns:a="http://schemas.openxmlformats.org/drawingml/2006/main" xmlns:p="http://schemas.openxmlformats.org/presentationml/2006/main" xmlns:r="http://schemas.openxmlformats.org/officeDocument/2006/relationships">
+  <p:cSld>
+    <p:spTree>
+      <p:nvGrpSpPr>
+        <p:cNvPr id="1" name=""/>
+        <p:cNvGrpSpPr/>
+        <p:nvPr/>
+      </p:nvGrpSpPr>
+      <p:grpSpPr>
+        <a:xfrm>
+          <a:off x="0" y="0"/>
+          <a:ext cx="0" cy="0"/>
+          <a:chOff x="0" y="0"/>
+          <a:chExt cx="0" cy="0"/>
+        </a:xfrm>
+      </p:grpSpPr>
+      <p:sp>
+        <p:nvSpPr>
+          <p:cNvPr id="112" name="CustomShape 1"/>
+          <p:cNvSpPr/>
+          <p:nvPr/>
+        </p:nvSpPr>
+        <p:spPr>
+          <a:xfrm>
+            <a:off x="838080" y="365040"/>
+            <a:ext cx="10514520" cy="1324440"/>
+          </a:xfrm>
+          <a:prstGeom prst="rect">
+            <a:avLst/>
+          </a:prstGeom>
+          <a:noFill/>
+          <a:ln>
+            <a:noFill/>
+          </a:ln>
+        </p:spPr>
+        <p:txBody>
+          <a:bodyPr lIns="90000" rIns="90000" tIns="45000" bIns="45000" anchor="ctr"/>
+          <a:p>
+            <a:pPr>
+              <a:lnSpc>
+                <a:spcPct val="90000"/>
+              </a:lnSpc>
+            </a:pPr>
+            <a:r>
+              <a:rPr lang="en-US" sz="4400">
+                <a:solidFill>
+                  <a:srgbClr val="000000"/>
+                </a:solidFill>
+                <a:latin typeface="Calibri Light"/>
+              </a:rPr>
+              <a:t>Moda</a:t>
+            </a:r>
+            <a:endParaRPr/>
+          </a:p>
+        </p:txBody>
+      </p:sp>
+      <p:sp>
+        <p:nvSpPr>
+          <p:cNvPr id="113" name="CustomShape 2"/>
+          <p:cNvSpPr/>
+          <p:nvPr/>
+        </p:nvSpPr>
+        <p:spPr>
+          <a:xfrm>
+            <a:off x="838080" y="1825560"/>
+            <a:ext cx="10514520" cy="4350240"/>
+          </a:xfrm>
+          <a:prstGeom prst="rect">
+            <a:avLst/>
+          </a:prstGeom>
+          <a:noFill/>
+          <a:ln>
+            <a:noFill/>
+          </a:ln>
+        </p:spPr>
+        <p:txBody>
+          <a:bodyPr lIns="90000" rIns="90000" tIns="45000" bIns="45000"/>
+          <a:p>
+            <a:pPr>
+              <a:lnSpc>
+                <a:spcPct val="100000"/>
+              </a:lnSpc>
+            </a:pPr>
+            <a:endParaRPr/>
+          </a:p>
+          <a:p>
+            <a:pPr>
+              <a:lnSpc>
+                <a:spcPct val="100000"/>
+              </a:lnSpc>
+            </a:pPr>
+            <a:r>
+              <a:rPr lang="en-US" sz="2800">
+                <a:solidFill>
+                  <a:srgbClr val="385623"/>
+                </a:solidFill>
+                <a:latin typeface="Lucida Console"/>
+              </a:rPr>
+              <a:t>Qual pokémon da nossa lista corresponde à moda? Isto é, qual o pokémon mais comum do nosso conjunto de dados?</a:t>
+            </a:r>
+            <a:endParaRPr/>
+          </a:p>
+        </p:txBody>
+      </p:sp>
+    </p:spTree>
+  </p:cSld>
+  <p:timing>
+    <p:tnLst>
+      <p:par>
+        <p:cTn id="41" dur="indefinite" restart="never" nodeType="tmRoot">
+          <p:childTnLst>
+            <p:seq>
+              <p:cTn id="42" nodeType="mainSeq"/>
               <p:prevCondLst>
                 <p:cond delay="0" evt="onPrev">
                   <p:tgtEl>
@@ -5038,7 +5570,7 @@
         <p:spPr>
           <a:xfrm>
             <a:off x="838080" y="365040"/>
-            <a:ext cx="10514880" cy="1324800"/>
+            <a:ext cx="10514520" cy="1324440"/>
           </a:xfrm>
           <a:prstGeom prst="rect">
             <a:avLst/>
@@ -5078,7 +5610,7 @@
         <p:spPr>
           <a:xfrm>
             <a:off x="838080" y="1825560"/>
-            <a:ext cx="10514880" cy="4350600"/>
+            <a:ext cx="10514520" cy="4350240"/>
           </a:xfrm>
           <a:prstGeom prst="rect">
             <a:avLst/>
@@ -5250,7 +5782,7 @@
         <p:spPr>
           <a:xfrm>
             <a:off x="838080" y="365040"/>
-            <a:ext cx="10514880" cy="1324800"/>
+            <a:ext cx="10514520" cy="1324440"/>
           </a:xfrm>
           <a:prstGeom prst="rect">
             <a:avLst/>
@@ -5290,7 +5822,7 @@
         <p:spPr>
           <a:xfrm>
             <a:off x="838080" y="1825560"/>
-            <a:ext cx="10514880" cy="4350600"/>
+            <a:ext cx="10514520" cy="4350240"/>
           </a:xfrm>
           <a:prstGeom prst="rect">
             <a:avLst/>
@@ -5353,8 +5885,6 @@
               <a:lnSpc>
                 <a:spcPct val="90000"/>
               </a:lnSpc>
-              <a:buFont typeface="Arial"/>
-              <a:buChar char="•"/>
             </a:pPr>
             <a:endParaRPr/>
           </a:p>
@@ -5437,7 +5967,7 @@
         <p:spPr>
           <a:xfrm>
             <a:off x="838080" y="365040"/>
-            <a:ext cx="10514880" cy="1324800"/>
+            <a:ext cx="10514520" cy="1324440"/>
           </a:xfrm>
           <a:prstGeom prst="rect">
             <a:avLst/>
@@ -5483,7 +6013,7 @@
         <p:spPr>
           <a:xfrm>
             <a:off x="3945960" y="1427760"/>
-            <a:ext cx="3826080" cy="4916520"/>
+            <a:ext cx="3825720" cy="4916160"/>
           </a:xfrm>
           <a:prstGeom prst="rect">
             <a:avLst/>
@@ -5551,7 +6081,7 @@
         <p:spPr>
           <a:xfrm>
             <a:off x="838080" y="365040"/>
-            <a:ext cx="10514880" cy="1324800"/>
+            <a:ext cx="10514520" cy="1324440"/>
           </a:xfrm>
           <a:prstGeom prst="rect">
             <a:avLst/>
@@ -5591,7 +6121,7 @@
         <p:spPr>
           <a:xfrm>
             <a:off x="838080" y="1825560"/>
-            <a:ext cx="10514880" cy="4350600"/>
+            <a:ext cx="10514520" cy="4350240"/>
           </a:xfrm>
           <a:prstGeom prst="rect">
             <a:avLst/>
@@ -5807,7 +6337,7 @@
         <p:spPr>
           <a:xfrm>
             <a:off x="838080" y="365040"/>
-            <a:ext cx="10514880" cy="1324800"/>
+            <a:ext cx="10514520" cy="1324440"/>
           </a:xfrm>
           <a:prstGeom prst="rect">
             <a:avLst/>
@@ -5847,7 +6377,7 @@
         <p:spPr>
           <a:xfrm>
             <a:off x="838080" y="1825560"/>
-            <a:ext cx="10514880" cy="4350600"/>
+            <a:ext cx="10514520" cy="4350240"/>
           </a:xfrm>
           <a:prstGeom prst="rect">
             <a:avLst/>
@@ -5948,7 +6478,7 @@
                 </a:solidFill>
                 <a:latin typeface="Lucida Console"/>
               </a:rPr>
-              <a:t>Blábláblá </a:t>
+              <a:t>Blá blá blá </a:t>
             </a:r>
             <a:endParaRPr/>
           </a:p>
@@ -6020,7 +6550,7 @@
         <p:spPr>
           <a:xfrm>
             <a:off x="838080" y="365040"/>
-            <a:ext cx="10514880" cy="1324800"/>
+            <a:ext cx="10514520" cy="1324440"/>
           </a:xfrm>
           <a:prstGeom prst="rect">
             <a:avLst/>
@@ -6060,7 +6590,7 @@
         <p:spPr>
           <a:xfrm>
             <a:off x="838080" y="1825560"/>
-            <a:ext cx="10514880" cy="4350600"/>
+            <a:ext cx="10514520" cy="4350240"/>
           </a:xfrm>
           <a:prstGeom prst="rect">
             <a:avLst/>
@@ -6208,7 +6738,7 @@
         <p:spPr>
           <a:xfrm>
             <a:off x="838080" y="365040"/>
-            <a:ext cx="10514880" cy="1324800"/>
+            <a:ext cx="10514520" cy="1324440"/>
           </a:xfrm>
           <a:prstGeom prst="rect">
             <a:avLst/>
@@ -6248,7 +6778,7 @@
         <p:spPr>
           <a:xfrm>
             <a:off x="838080" y="1825560"/>
-            <a:ext cx="10514880" cy="4350600"/>
+            <a:ext cx="10514520" cy="4350240"/>
           </a:xfrm>
           <a:prstGeom prst="rect">
             <a:avLst/>

</xml_diff>

<commit_message>
Frequencies for pokemons added
</commit_message>
<xml_diff>
--- a/presentation.pptx
+++ b/presentation.pptx
@@ -27,6 +27,12 @@
     <p:sldId id="274" r:id="rId22"/>
     <p:sldId id="275" r:id="rId23"/>
     <p:sldId id="276" r:id="rId24"/>
+    <p:sldId id="277" r:id="rId25"/>
+    <p:sldId id="278" r:id="rId26"/>
+    <p:sldId id="279" r:id="rId27"/>
+    <p:sldId id="280" r:id="rId28"/>
+    <p:sldId id="281" r:id="rId29"/>
+    <p:sldId id="282" r:id="rId30"/>
   </p:sldIdLst>
   <p:sldSz cx="12192000" cy="6858000"/>
   <p:notesSz cx="7559675" cy="10691812"/>
@@ -2386,7 +2392,7 @@
         <p:spPr>
           <a:xfrm>
             <a:off x="609480" y="273600"/>
-            <a:ext cx="10972080" cy="1144800"/>
+            <a:ext cx="10972440" cy="1144800"/>
           </a:xfrm>
           <a:prstGeom prst="rect">
             <a:avLst/>
@@ -2395,8 +2401,9 @@
         <p:txBody>
           <a:bodyPr lIns="0" rIns="0" tIns="0" bIns="0" anchor="ctr"/>
           <a:p>
-            <a:r>
-              <a:rPr lang="en-US">
+            <a:pPr algn="ctr"/>
+            <a:r>
+              <a:rPr lang="en-US" sz="4400">
                 <a:latin typeface="Arial"/>
               </a:rPr>
               <a:t>Click to edit the title text format</a:t>
@@ -2418,7 +2425,7 @@
         <p:spPr>
           <a:xfrm>
             <a:off x="609480" y="1604520"/>
-            <a:ext cx="10972080" cy="3976920"/>
+            <a:ext cx="10972440" cy="3977280"/>
           </a:xfrm>
           <a:prstGeom prst="rect">
             <a:avLst/>
@@ -2433,7 +2440,7 @@
               <a:buChar char=""/>
             </a:pPr>
             <a:r>
-              <a:rPr lang="en-US">
+              <a:rPr lang="en-US" sz="3200">
                 <a:latin typeface="Arial"/>
               </a:rPr>
               <a:t>Click to edit the outline text format</a:t>
@@ -2447,7 +2454,7 @@
               <a:buChar char=""/>
             </a:pPr>
             <a:r>
-              <a:rPr lang="en-US">
+              <a:rPr lang="en-US" sz="2800">
                 <a:latin typeface="Arial"/>
               </a:rPr>
               <a:t>Second Outline Level</a:t>
@@ -2461,7 +2468,7 @@
               <a:buChar char=""/>
             </a:pPr>
             <a:r>
-              <a:rPr lang="en-US">
+              <a:rPr lang="en-US" sz="2400">
                 <a:latin typeface="Arial"/>
               </a:rPr>
               <a:t>Third Outline Level</a:t>
@@ -2475,7 +2482,7 @@
               <a:buChar char=""/>
             </a:pPr>
             <a:r>
-              <a:rPr lang="en-US">
+              <a:rPr lang="en-US" sz="2000">
                 <a:latin typeface="Arial"/>
               </a:rPr>
               <a:t>Fourth Outline Level</a:t>
@@ -2489,7 +2496,7 @@
               <a:buChar char=""/>
             </a:pPr>
             <a:r>
-              <a:rPr lang="en-US">
+              <a:rPr lang="en-US" sz="2000">
                 <a:latin typeface="Arial"/>
               </a:rPr>
               <a:t>Fifth Outline Level</a:t>
@@ -2503,7 +2510,7 @@
               <a:buChar char=""/>
             </a:pPr>
             <a:r>
-              <a:rPr lang="en-US">
+              <a:rPr lang="en-US" sz="2000">
                 <a:latin typeface="Arial"/>
               </a:rPr>
               <a:t>Sixth Outline Level</a:t>
@@ -2517,7 +2524,7 @@
               <a:buChar char=""/>
             </a:pPr>
             <a:r>
-              <a:rPr lang="en-US">
+              <a:rPr lang="en-US" sz="2000">
                 <a:latin typeface="Arial"/>
               </a:rPr>
               <a:t>Seventh Outline Level</a:t>
@@ -2770,7 +2777,7 @@
         <p:spPr>
           <a:xfrm>
             <a:off x="1523880" y="1122480"/>
-            <a:ext cx="9142920" cy="2386440"/>
+            <a:ext cx="9142200" cy="2385720"/>
           </a:xfrm>
           <a:prstGeom prst="rect">
             <a:avLst/>
@@ -2859,7 +2866,7 @@
         <p:spPr>
           <a:xfrm>
             <a:off x="838080" y="365040"/>
-            <a:ext cx="10514520" cy="1324440"/>
+            <a:ext cx="10513800" cy="1323720"/>
           </a:xfrm>
           <a:prstGeom prst="rect">
             <a:avLst/>
@@ -2899,7 +2906,7 @@
         <p:spPr>
           <a:xfrm>
             <a:off x="838080" y="1825560"/>
-            <a:ext cx="10514520" cy="4350240"/>
+            <a:ext cx="10513800" cy="4349520"/>
           </a:xfrm>
           <a:prstGeom prst="rect">
             <a:avLst/>
@@ -3061,7 +3068,7 @@
         <p:spPr>
           <a:xfrm>
             <a:off x="838080" y="365040"/>
-            <a:ext cx="10514520" cy="1324440"/>
+            <a:ext cx="10513800" cy="1323720"/>
           </a:xfrm>
           <a:prstGeom prst="rect">
             <a:avLst/>
@@ -3101,7 +3108,7 @@
         <p:spPr>
           <a:xfrm>
             <a:off x="838080" y="1825560"/>
-            <a:ext cx="10514520" cy="4350240"/>
+            <a:ext cx="10513800" cy="4349520"/>
           </a:xfrm>
           <a:prstGeom prst="rect">
             <a:avLst/>
@@ -3249,7 +3256,7 @@
         <p:spPr>
           <a:xfrm>
             <a:off x="838080" y="365040"/>
-            <a:ext cx="10514520" cy="1324440"/>
+            <a:ext cx="10513800" cy="1323720"/>
           </a:xfrm>
           <a:prstGeom prst="rect">
             <a:avLst/>
@@ -3289,7 +3296,7 @@
         <p:spPr>
           <a:xfrm>
             <a:off x="838080" y="1825560"/>
-            <a:ext cx="10514520" cy="4350240"/>
+            <a:ext cx="10513800" cy="4349520"/>
           </a:xfrm>
           <a:prstGeom prst="rect">
             <a:avLst/>
@@ -3477,7 +3484,7 @@
         <p:spPr>
           <a:xfrm>
             <a:off x="838080" y="365040"/>
-            <a:ext cx="10514520" cy="1324440"/>
+            <a:ext cx="10513800" cy="1323720"/>
           </a:xfrm>
           <a:prstGeom prst="rect">
             <a:avLst/>
@@ -3517,7 +3524,7 @@
         <p:spPr>
           <a:xfrm>
             <a:off x="838080" y="1825560"/>
-            <a:ext cx="10514520" cy="4350240"/>
+            <a:ext cx="10513800" cy="4349520"/>
           </a:xfrm>
           <a:prstGeom prst="rect">
             <a:avLst/>
@@ -3656,7 +3663,7 @@
         <p:spPr>
           <a:xfrm>
             <a:off x="838080" y="365040"/>
-            <a:ext cx="10514520" cy="1324440"/>
+            <a:ext cx="10513800" cy="1323720"/>
           </a:xfrm>
           <a:prstGeom prst="rect">
             <a:avLst/>
@@ -3696,7 +3703,7 @@
         <p:spPr>
           <a:xfrm>
             <a:off x="838080" y="1825560"/>
-            <a:ext cx="10514520" cy="4350240"/>
+            <a:ext cx="10513800" cy="4349520"/>
           </a:xfrm>
           <a:prstGeom prst="rect">
             <a:avLst/>
@@ -3884,7 +3891,7 @@
         <p:spPr>
           <a:xfrm>
             <a:off x="838080" y="365040"/>
-            <a:ext cx="10514520" cy="1324440"/>
+            <a:ext cx="10513800" cy="1323720"/>
           </a:xfrm>
           <a:prstGeom prst="rect">
             <a:avLst/>
@@ -3924,7 +3931,7 @@
         <p:spPr>
           <a:xfrm>
             <a:off x="838080" y="1825560"/>
-            <a:ext cx="10514520" cy="4350240"/>
+            <a:ext cx="10513800" cy="4349520"/>
           </a:xfrm>
           <a:prstGeom prst="rect">
             <a:avLst/>
@@ -4172,7 +4179,7 @@
         <p:spPr>
           <a:xfrm>
             <a:off x="838080" y="365040"/>
-            <a:ext cx="10514520" cy="1324440"/>
+            <a:ext cx="10513800" cy="1323720"/>
           </a:xfrm>
           <a:prstGeom prst="rect">
             <a:avLst/>
@@ -4212,7 +4219,7 @@
         <p:spPr>
           <a:xfrm>
             <a:off x="838080" y="1825560"/>
-            <a:ext cx="10514520" cy="4350240"/>
+            <a:ext cx="10513800" cy="4349520"/>
           </a:xfrm>
           <a:prstGeom prst="rect">
             <a:avLst/>
@@ -4366,7 +4373,7 @@
         <p:spPr>
           <a:xfrm>
             <a:off x="838080" y="365040"/>
-            <a:ext cx="10514520" cy="1324440"/>
+            <a:ext cx="10513800" cy="1323720"/>
           </a:xfrm>
           <a:prstGeom prst="rect">
             <a:avLst/>
@@ -4406,7 +4413,7 @@
         <p:spPr>
           <a:xfrm>
             <a:off x="838080" y="1825560"/>
-            <a:ext cx="10514520" cy="4350240"/>
+            <a:ext cx="10513800" cy="4349520"/>
           </a:xfrm>
           <a:prstGeom prst="rect">
             <a:avLst/>
@@ -4560,7 +4567,7 @@
         <p:spPr>
           <a:xfrm>
             <a:off x="838080" y="365040"/>
-            <a:ext cx="10514520" cy="1324440"/>
+            <a:ext cx="10513800" cy="1323720"/>
           </a:xfrm>
           <a:prstGeom prst="rect">
             <a:avLst/>
@@ -4600,7 +4607,7 @@
         <p:spPr>
           <a:xfrm>
             <a:off x="838080" y="1825560"/>
-            <a:ext cx="10514520" cy="4350240"/>
+            <a:ext cx="10513800" cy="4349520"/>
           </a:xfrm>
           <a:prstGeom prst="rect">
             <a:avLst/>
@@ -4714,7 +4721,7 @@
         <p:spPr>
           <a:xfrm>
             <a:off x="838080" y="365040"/>
-            <a:ext cx="10514520" cy="1324440"/>
+            <a:ext cx="10513800" cy="1323720"/>
           </a:xfrm>
           <a:prstGeom prst="rect">
             <a:avLst/>
@@ -4754,7 +4761,7 @@
         <p:spPr>
           <a:xfrm>
             <a:off x="838080" y="1825560"/>
-            <a:ext cx="10514520" cy="4350240"/>
+            <a:ext cx="10513800" cy="4349520"/>
           </a:xfrm>
           <a:prstGeom prst="rect">
             <a:avLst/>
@@ -4910,7 +4917,7 @@
         <p:spPr>
           <a:xfrm>
             <a:off x="838080" y="365040"/>
-            <a:ext cx="10514520" cy="1324440"/>
+            <a:ext cx="10513800" cy="1323720"/>
           </a:xfrm>
           <a:prstGeom prst="rect">
             <a:avLst/>
@@ -4950,7 +4957,7 @@
         <p:spPr>
           <a:xfrm>
             <a:off x="838080" y="1825560"/>
-            <a:ext cx="10514520" cy="2473560"/>
+            <a:ext cx="10513800" cy="2472840"/>
           </a:xfrm>
           <a:prstGeom prst="rect">
             <a:avLst/>
@@ -5062,7 +5069,7 @@
         <p:spPr>
           <a:xfrm>
             <a:off x="1270800" y="4628160"/>
-            <a:ext cx="9649440" cy="1407600"/>
+            <a:ext cx="9648720" cy="1406880"/>
           </a:xfrm>
           <a:prstGeom prst="roundRect">
             <a:avLst>
@@ -5229,7 +5236,7 @@
         <p:spPr>
           <a:xfrm>
             <a:off x="838080" y="365040"/>
-            <a:ext cx="10514520" cy="1324440"/>
+            <a:ext cx="10513800" cy="1323720"/>
           </a:xfrm>
           <a:prstGeom prst="rect">
             <a:avLst/>
@@ -5269,7 +5276,7 @@
         <p:spPr>
           <a:xfrm>
             <a:off x="838080" y="1825560"/>
-            <a:ext cx="10514520" cy="4350240"/>
+            <a:ext cx="10513800" cy="4349520"/>
           </a:xfrm>
           <a:prstGeom prst="rect">
             <a:avLst/>
@@ -5433,7 +5440,7 @@
         <p:spPr>
           <a:xfrm>
             <a:off x="838080" y="365040"/>
-            <a:ext cx="10514520" cy="1324440"/>
+            <a:ext cx="10513800" cy="1323720"/>
           </a:xfrm>
           <a:prstGeom prst="rect">
             <a:avLst/>
@@ -5473,7 +5480,7 @@
         <p:spPr>
           <a:xfrm>
             <a:off x="838080" y="1825560"/>
-            <a:ext cx="10514520" cy="4350240"/>
+            <a:ext cx="10513800" cy="4349520"/>
           </a:xfrm>
           <a:prstGeom prst="rect">
             <a:avLst/>
@@ -5504,7 +5511,7 @@
                 <a:solidFill>
                   <a:srgbClr val="385623"/>
                 </a:solidFill>
-                <a:latin typeface="Lucida Console"/>
+                <a:latin typeface="Calibri light"/>
               </a:rPr>
               <a:t>Qual pokémon da nossa lista corresponde à moda? Isto é, qual o pokémon mais comum do nosso conjunto de dados?</a:t>
             </a:r>
@@ -5521,6 +5528,1260 @@
           <p:childTnLst>
             <p:seq>
               <p:cTn id="42" nodeType="mainSeq"/>
+              <p:prevCondLst>
+                <p:cond delay="0" evt="onPrev">
+                  <p:tgtEl>
+                    <p:sldTgt/>
+                  </p:tgtEl>
+                </p:cond>
+              </p:prevCondLst>
+              <p:nextCondLst>
+                <p:cond delay="0" evt="onNext">
+                  <p:tgtEl>
+                    <p:sldTgt/>
+                  </p:tgtEl>
+                </p:cond>
+              </p:nextCondLst>
+            </p:seq>
+          </p:childTnLst>
+        </p:cTn>
+      </p:par>
+    </p:tnLst>
+  </p:timing>
+</p:sld>
+</file>
+
+<file path=ppt/slides/slide22.xml><?xml version="1.0" encoding="utf-8"?>
+<p:sld xmlns:a="http://schemas.openxmlformats.org/drawingml/2006/main" xmlns:p="http://schemas.openxmlformats.org/presentationml/2006/main" xmlns:r="http://schemas.openxmlformats.org/officeDocument/2006/relationships">
+  <p:cSld>
+    <p:spTree>
+      <p:nvGrpSpPr>
+        <p:cNvPr id="1" name=""/>
+        <p:cNvGrpSpPr/>
+        <p:nvPr/>
+      </p:nvGrpSpPr>
+      <p:grpSpPr>
+        <a:xfrm>
+          <a:off x="0" y="0"/>
+          <a:ext cx="0" cy="0"/>
+          <a:chOff x="0" y="0"/>
+          <a:chExt cx="0" cy="0"/>
+        </a:xfrm>
+      </p:grpSpPr>
+      <p:sp>
+        <p:nvSpPr>
+          <p:cNvPr id="114" name="CustomShape 1"/>
+          <p:cNvSpPr/>
+          <p:nvPr/>
+        </p:nvSpPr>
+        <p:spPr>
+          <a:xfrm>
+            <a:off x="838080" y="365040"/>
+            <a:ext cx="10513800" cy="1323720"/>
+          </a:xfrm>
+          <a:prstGeom prst="rect">
+            <a:avLst/>
+          </a:prstGeom>
+          <a:noFill/>
+          <a:ln>
+            <a:noFill/>
+          </a:ln>
+        </p:spPr>
+        <p:txBody>
+          <a:bodyPr lIns="90000" rIns="90000" tIns="45000" bIns="45000" anchor="ctr"/>
+          <a:p>
+            <a:pPr>
+              <a:lnSpc>
+                <a:spcPct val="90000"/>
+              </a:lnSpc>
+            </a:pPr>
+            <a:r>
+              <a:rPr lang="en-US" sz="4400">
+                <a:solidFill>
+                  <a:srgbClr val="000000"/>
+                </a:solidFill>
+                <a:latin typeface="Calibri Light"/>
+              </a:rPr>
+              <a:t>Distribuição de Frequências</a:t>
+            </a:r>
+            <a:endParaRPr/>
+          </a:p>
+        </p:txBody>
+      </p:sp>
+      <p:sp>
+        <p:nvSpPr>
+          <p:cNvPr id="115" name="CustomShape 2"/>
+          <p:cNvSpPr/>
+          <p:nvPr/>
+        </p:nvSpPr>
+        <p:spPr>
+          <a:xfrm>
+            <a:off x="838080" y="1825560"/>
+            <a:ext cx="10513800" cy="4349520"/>
+          </a:xfrm>
+          <a:prstGeom prst="rect">
+            <a:avLst/>
+          </a:prstGeom>
+          <a:noFill/>
+          <a:ln>
+            <a:noFill/>
+          </a:ln>
+        </p:spPr>
+        <p:txBody>
+          <a:bodyPr lIns="90000" rIns="90000" tIns="45000" bIns="45000"/>
+          <a:p>
+            <a:pPr>
+              <a:lnSpc>
+                <a:spcPct val="100000"/>
+              </a:lnSpc>
+            </a:pPr>
+            <a:endParaRPr/>
+          </a:p>
+          <a:p>
+            <a:pPr>
+              <a:lnSpc>
+                <a:spcPct val="90000"/>
+              </a:lnSpc>
+            </a:pPr>
+            <a:r>
+              <a:rPr lang="en-US" sz="2800">
+                <a:solidFill>
+                  <a:srgbClr val="000000"/>
+                </a:solidFill>
+                <a:latin typeface="Calibri"/>
+              </a:rPr>
+              <a:t>Frequência absoluta: número de vezes que um determinado evento ocorreu em um experimento</a:t>
+            </a:r>
+            <a:endParaRPr/>
+          </a:p>
+          <a:p>
+            <a:pPr>
+              <a:lnSpc>
+                <a:spcPct val="100000"/>
+              </a:lnSpc>
+            </a:pPr>
+            <a:endParaRPr/>
+          </a:p>
+          <a:p>
+            <a:pPr>
+              <a:lnSpc>
+                <a:spcPct val="100000"/>
+              </a:lnSpc>
+            </a:pPr>
+            <a:r>
+              <a:rPr lang="en-US" sz="2800">
+                <a:solidFill>
+                  <a:srgbClr val="385623"/>
+                </a:solidFill>
+                <a:latin typeface="Lucida Console"/>
+              </a:rPr>
+              <a:t>Para esta finalidade, o módulo stats do pacote SciPy nos fornece o método itemfreq()</a:t>
+            </a:r>
+            <a:endParaRPr/>
+          </a:p>
+          <a:p>
+            <a:pPr>
+              <a:lnSpc>
+                <a:spcPct val="100000"/>
+              </a:lnSpc>
+            </a:pPr>
+            <a:endParaRPr/>
+          </a:p>
+        </p:txBody>
+      </p:sp>
+    </p:spTree>
+  </p:cSld>
+  <p:timing>
+    <p:tnLst>
+      <p:par>
+        <p:cTn id="43" dur="indefinite" restart="never" nodeType="tmRoot">
+          <p:childTnLst>
+            <p:seq>
+              <p:cTn id="44" nodeType="mainSeq"/>
+              <p:prevCondLst>
+                <p:cond delay="0" evt="onPrev">
+                  <p:tgtEl>
+                    <p:sldTgt/>
+                  </p:tgtEl>
+                </p:cond>
+              </p:prevCondLst>
+              <p:nextCondLst>
+                <p:cond delay="0" evt="onNext">
+                  <p:tgtEl>
+                    <p:sldTgt/>
+                  </p:tgtEl>
+                </p:cond>
+              </p:nextCondLst>
+            </p:seq>
+          </p:childTnLst>
+        </p:cTn>
+      </p:par>
+    </p:tnLst>
+  </p:timing>
+</p:sld>
+</file>
+
+<file path=ppt/slides/slide23.xml><?xml version="1.0" encoding="utf-8"?>
+<p:sld xmlns:a="http://schemas.openxmlformats.org/drawingml/2006/main" xmlns:p="http://schemas.openxmlformats.org/presentationml/2006/main" xmlns:r="http://schemas.openxmlformats.org/officeDocument/2006/relationships">
+  <p:cSld>
+    <p:spTree>
+      <p:nvGrpSpPr>
+        <p:cNvPr id="1" name=""/>
+        <p:cNvGrpSpPr/>
+        <p:nvPr/>
+      </p:nvGrpSpPr>
+      <p:grpSpPr>
+        <a:xfrm>
+          <a:off x="0" y="0"/>
+          <a:ext cx="0" cy="0"/>
+          <a:chOff x="0" y="0"/>
+          <a:chExt cx="0" cy="0"/>
+        </a:xfrm>
+      </p:grpSpPr>
+      <p:sp>
+        <p:nvSpPr>
+          <p:cNvPr id="116" name="CustomShape 1"/>
+          <p:cNvSpPr/>
+          <p:nvPr/>
+        </p:nvSpPr>
+        <p:spPr>
+          <a:xfrm>
+            <a:off x="838080" y="365040"/>
+            <a:ext cx="10513800" cy="1323720"/>
+          </a:xfrm>
+          <a:prstGeom prst="rect">
+            <a:avLst/>
+          </a:prstGeom>
+          <a:noFill/>
+          <a:ln>
+            <a:noFill/>
+          </a:ln>
+        </p:spPr>
+        <p:txBody>
+          <a:bodyPr lIns="90000" rIns="90000" tIns="45000" bIns="45000" anchor="ctr"/>
+          <a:p>
+            <a:pPr>
+              <a:lnSpc>
+                <a:spcPct val="90000"/>
+              </a:lnSpc>
+            </a:pPr>
+            <a:r>
+              <a:rPr lang="en-US" sz="4400">
+                <a:solidFill>
+                  <a:srgbClr val="000000"/>
+                </a:solidFill>
+                <a:latin typeface="Calibri Light"/>
+              </a:rPr>
+              <a:t>Distribuição de Frequências</a:t>
+            </a:r>
+            <a:endParaRPr/>
+          </a:p>
+        </p:txBody>
+      </p:sp>
+      <p:sp>
+        <p:nvSpPr>
+          <p:cNvPr id="117" name="CustomShape 2"/>
+          <p:cNvSpPr/>
+          <p:nvPr/>
+        </p:nvSpPr>
+        <p:spPr>
+          <a:xfrm>
+            <a:off x="838080" y="1825560"/>
+            <a:ext cx="10513800" cy="4349520"/>
+          </a:xfrm>
+          <a:prstGeom prst="rect">
+            <a:avLst/>
+          </a:prstGeom>
+          <a:noFill/>
+          <a:ln>
+            <a:noFill/>
+          </a:ln>
+        </p:spPr>
+        <p:txBody>
+          <a:bodyPr lIns="90000" rIns="90000" tIns="45000" bIns="45000"/>
+          <a:p>
+            <a:pPr>
+              <a:lnSpc>
+                <a:spcPct val="100000"/>
+              </a:lnSpc>
+            </a:pPr>
+            <a:endParaRPr/>
+          </a:p>
+          <a:p>
+            <a:pPr>
+              <a:lnSpc>
+                <a:spcPct val="90000"/>
+              </a:lnSpc>
+            </a:pPr>
+            <a:r>
+              <a:rPr lang="en-US" sz="2800">
+                <a:solidFill>
+                  <a:srgbClr val="000000"/>
+                </a:solidFill>
+                <a:latin typeface="Lucida console"/>
+              </a:rPr>
+              <a:t>from scipy import stats</a:t>
+            </a:r>
+            <a:endParaRPr/>
+          </a:p>
+          <a:p>
+            <a:pPr>
+              <a:lnSpc>
+                <a:spcPct val="100000"/>
+              </a:lnSpc>
+            </a:pPr>
+            <a:endParaRPr/>
+          </a:p>
+          <a:p>
+            <a:pPr>
+              <a:lnSpc>
+                <a:spcPct val="100000"/>
+              </a:lnSpc>
+            </a:pPr>
+            <a:r>
+              <a:rPr lang="en-US" sz="2800">
+                <a:solidFill>
+                  <a:srgbClr val="385623"/>
+                </a:solidFill>
+                <a:latin typeface="Lucida console"/>
+              </a:rPr>
+              <a:t>numeros = [10, 50, 20, 20, 10]</a:t>
+            </a:r>
+            <a:endParaRPr/>
+          </a:p>
+          <a:p>
+            <a:pPr>
+              <a:lnSpc>
+                <a:spcPct val="100000"/>
+              </a:lnSpc>
+            </a:pPr>
+            <a:r>
+              <a:rPr lang="en-US" sz="2800">
+                <a:solidFill>
+                  <a:srgbClr val="385623"/>
+                </a:solidFill>
+                <a:latin typeface="Lucida console"/>
+              </a:rPr>
+              <a:t>stats.itemfreq(numeros)</a:t>
+            </a:r>
+            <a:endParaRPr/>
+          </a:p>
+          <a:p>
+            <a:pPr>
+              <a:lnSpc>
+                <a:spcPct val="100000"/>
+              </a:lnSpc>
+            </a:pPr>
+            <a:endParaRPr/>
+          </a:p>
+          <a:p>
+            <a:pPr>
+              <a:lnSpc>
+                <a:spcPct val="100000"/>
+              </a:lnSpc>
+            </a:pPr>
+            <a:r>
+              <a:rPr lang="en-US" sz="2800">
+                <a:solidFill>
+                  <a:srgbClr val="385623"/>
+                </a:solidFill>
+                <a:latin typeface="Lucida Console"/>
+              </a:rPr>
+              <a:t>array([[10,  2],</a:t>
+            </a:r>
+            <a:endParaRPr/>
+          </a:p>
+          <a:p>
+            <a:pPr>
+              <a:lnSpc>
+                <a:spcPct val="100000"/>
+              </a:lnSpc>
+            </a:pPr>
+            <a:r>
+              <a:rPr lang="en-US" sz="2800">
+                <a:solidFill>
+                  <a:srgbClr val="385623"/>
+                </a:solidFill>
+                <a:latin typeface="Lucida Console"/>
+              </a:rPr>
+              <a:t>       </a:t>
+            </a:r>
+            <a:r>
+              <a:rPr lang="en-US" sz="2800">
+                <a:solidFill>
+                  <a:srgbClr val="385623"/>
+                </a:solidFill>
+                <a:latin typeface="Lucida Console"/>
+              </a:rPr>
+              <a:t>[20,  2],</a:t>
+            </a:r>
+            <a:endParaRPr/>
+          </a:p>
+          <a:p>
+            <a:pPr>
+              <a:lnSpc>
+                <a:spcPct val="100000"/>
+              </a:lnSpc>
+            </a:pPr>
+            <a:r>
+              <a:rPr lang="en-US" sz="2800">
+                <a:solidFill>
+                  <a:srgbClr val="385623"/>
+                </a:solidFill>
+                <a:latin typeface="Lucida Console"/>
+              </a:rPr>
+              <a:t>       </a:t>
+            </a:r>
+            <a:r>
+              <a:rPr lang="en-US" sz="2800">
+                <a:solidFill>
+                  <a:srgbClr val="385623"/>
+                </a:solidFill>
+                <a:latin typeface="Lucida Console"/>
+              </a:rPr>
+              <a:t>[50,  1]])</a:t>
+            </a:r>
+            <a:endParaRPr/>
+          </a:p>
+        </p:txBody>
+      </p:sp>
+    </p:spTree>
+  </p:cSld>
+  <p:timing>
+    <p:tnLst>
+      <p:par>
+        <p:cTn id="45" dur="indefinite" restart="never" nodeType="tmRoot">
+          <p:childTnLst>
+            <p:seq>
+              <p:cTn id="46" nodeType="mainSeq"/>
+              <p:prevCondLst>
+                <p:cond delay="0" evt="onPrev">
+                  <p:tgtEl>
+                    <p:sldTgt/>
+                  </p:tgtEl>
+                </p:cond>
+              </p:prevCondLst>
+              <p:nextCondLst>
+                <p:cond delay="0" evt="onNext">
+                  <p:tgtEl>
+                    <p:sldTgt/>
+                  </p:tgtEl>
+                </p:cond>
+              </p:nextCondLst>
+            </p:seq>
+          </p:childTnLst>
+        </p:cTn>
+      </p:par>
+    </p:tnLst>
+  </p:timing>
+</p:sld>
+</file>
+
+<file path=ppt/slides/slide24.xml><?xml version="1.0" encoding="utf-8"?>
+<p:sld xmlns:a="http://schemas.openxmlformats.org/drawingml/2006/main" xmlns:p="http://schemas.openxmlformats.org/presentationml/2006/main" xmlns:r="http://schemas.openxmlformats.org/officeDocument/2006/relationships">
+  <p:cSld>
+    <p:spTree>
+      <p:nvGrpSpPr>
+        <p:cNvPr id="1" name=""/>
+        <p:cNvGrpSpPr/>
+        <p:nvPr/>
+      </p:nvGrpSpPr>
+      <p:grpSpPr>
+        <a:xfrm>
+          <a:off x="0" y="0"/>
+          <a:ext cx="0" cy="0"/>
+          <a:chOff x="0" y="0"/>
+          <a:chExt cx="0" cy="0"/>
+        </a:xfrm>
+      </p:grpSpPr>
+      <p:sp>
+        <p:nvSpPr>
+          <p:cNvPr id="118" name="CustomShape 1"/>
+          <p:cNvSpPr/>
+          <p:nvPr/>
+        </p:nvSpPr>
+        <p:spPr>
+          <a:xfrm>
+            <a:off x="838080" y="365040"/>
+            <a:ext cx="10513800" cy="1323720"/>
+          </a:xfrm>
+          <a:prstGeom prst="rect">
+            <a:avLst/>
+          </a:prstGeom>
+          <a:noFill/>
+          <a:ln>
+            <a:noFill/>
+          </a:ln>
+        </p:spPr>
+        <p:txBody>
+          <a:bodyPr lIns="90000" rIns="90000" tIns="45000" bIns="45000" anchor="ctr"/>
+          <a:p>
+            <a:pPr>
+              <a:lnSpc>
+                <a:spcPct val="90000"/>
+              </a:lnSpc>
+            </a:pPr>
+            <a:r>
+              <a:rPr lang="en-US" sz="4400">
+                <a:solidFill>
+                  <a:srgbClr val="000000"/>
+                </a:solidFill>
+                <a:latin typeface="Calibri Light"/>
+              </a:rPr>
+              <a:t>Distribuição de Frequências</a:t>
+            </a:r>
+            <a:endParaRPr/>
+          </a:p>
+        </p:txBody>
+      </p:sp>
+      <p:sp>
+        <p:nvSpPr>
+          <p:cNvPr id="119" name="CustomShape 2"/>
+          <p:cNvSpPr/>
+          <p:nvPr/>
+        </p:nvSpPr>
+        <p:spPr>
+          <a:xfrm>
+            <a:off x="838080" y="1825560"/>
+            <a:ext cx="10513800" cy="4349520"/>
+          </a:xfrm>
+          <a:prstGeom prst="rect">
+            <a:avLst/>
+          </a:prstGeom>
+          <a:noFill/>
+          <a:ln>
+            <a:noFill/>
+          </a:ln>
+        </p:spPr>
+        <p:txBody>
+          <a:bodyPr lIns="90000" rIns="90000" tIns="45000" bIns="45000"/>
+          <a:p>
+            <a:pPr>
+              <a:lnSpc>
+                <a:spcPct val="100000"/>
+              </a:lnSpc>
+            </a:pPr>
+            <a:endParaRPr/>
+          </a:p>
+          <a:p>
+            <a:pPr>
+              <a:lnSpc>
+                <a:spcPct val="90000"/>
+              </a:lnSpc>
+            </a:pPr>
+            <a:r>
+              <a:rPr lang="en-US" sz="2800">
+                <a:latin typeface="Lucida Console"/>
+              </a:rPr>
+              <a:t>Calcule as frequências da nossa lista de pokémons. Armazene o resultado em uma variável chamada frequencias.</a:t>
+            </a:r>
+            <a:endParaRPr/>
+          </a:p>
+        </p:txBody>
+      </p:sp>
+    </p:spTree>
+  </p:cSld>
+  <p:timing>
+    <p:tnLst>
+      <p:par>
+        <p:cTn id="47" dur="indefinite" restart="never" nodeType="tmRoot">
+          <p:childTnLst>
+            <p:seq>
+              <p:cTn id="48" nodeType="mainSeq"/>
+              <p:prevCondLst>
+                <p:cond delay="0" evt="onPrev">
+                  <p:tgtEl>
+                    <p:sldTgt/>
+                  </p:tgtEl>
+                </p:cond>
+              </p:prevCondLst>
+              <p:nextCondLst>
+                <p:cond delay="0" evt="onNext">
+                  <p:tgtEl>
+                    <p:sldTgt/>
+                  </p:tgtEl>
+                </p:cond>
+              </p:nextCondLst>
+            </p:seq>
+          </p:childTnLst>
+        </p:cTn>
+      </p:par>
+    </p:tnLst>
+  </p:timing>
+</p:sld>
+</file>
+
+<file path=ppt/slides/slide25.xml><?xml version="1.0" encoding="utf-8"?>
+<p:sld xmlns:a="http://schemas.openxmlformats.org/drawingml/2006/main" xmlns:p="http://schemas.openxmlformats.org/presentationml/2006/main" xmlns:r="http://schemas.openxmlformats.org/officeDocument/2006/relationships">
+  <p:cSld>
+    <p:spTree>
+      <p:nvGrpSpPr>
+        <p:cNvPr id="1" name=""/>
+        <p:cNvGrpSpPr/>
+        <p:nvPr/>
+      </p:nvGrpSpPr>
+      <p:grpSpPr>
+        <a:xfrm>
+          <a:off x="0" y="0"/>
+          <a:ext cx="0" cy="0"/>
+          <a:chOff x="0" y="0"/>
+          <a:chExt cx="0" cy="0"/>
+        </a:xfrm>
+      </p:grpSpPr>
+      <p:sp>
+        <p:nvSpPr>
+          <p:cNvPr id="120" name="CustomShape 1"/>
+          <p:cNvSpPr/>
+          <p:nvPr/>
+        </p:nvSpPr>
+        <p:spPr>
+          <a:xfrm>
+            <a:off x="838080" y="365040"/>
+            <a:ext cx="10513800" cy="1323720"/>
+          </a:xfrm>
+          <a:prstGeom prst="rect">
+            <a:avLst/>
+          </a:prstGeom>
+          <a:noFill/>
+          <a:ln>
+            <a:noFill/>
+          </a:ln>
+        </p:spPr>
+        <p:txBody>
+          <a:bodyPr lIns="90000" rIns="90000" tIns="45000" bIns="45000" anchor="ctr"/>
+          <a:p>
+            <a:pPr>
+              <a:lnSpc>
+                <a:spcPct val="90000"/>
+              </a:lnSpc>
+            </a:pPr>
+            <a:r>
+              <a:rPr lang="en-US" sz="4400">
+                <a:solidFill>
+                  <a:srgbClr val="000000"/>
+                </a:solidFill>
+                <a:latin typeface="Calibri Light"/>
+              </a:rPr>
+              <a:t>Distribuição de Frequências</a:t>
+            </a:r>
+            <a:endParaRPr/>
+          </a:p>
+        </p:txBody>
+      </p:sp>
+      <p:sp>
+        <p:nvSpPr>
+          <p:cNvPr id="121" name="CustomShape 2"/>
+          <p:cNvSpPr/>
+          <p:nvPr/>
+        </p:nvSpPr>
+        <p:spPr>
+          <a:xfrm>
+            <a:off x="838080" y="1825560"/>
+            <a:ext cx="10513800" cy="4349520"/>
+          </a:xfrm>
+          <a:prstGeom prst="rect">
+            <a:avLst/>
+          </a:prstGeom>
+          <a:noFill/>
+          <a:ln>
+            <a:noFill/>
+          </a:ln>
+        </p:spPr>
+        <p:txBody>
+          <a:bodyPr lIns="90000" rIns="90000" tIns="45000" bIns="45000"/>
+          <a:p>
+            <a:pPr>
+              <a:lnSpc>
+                <a:spcPct val="100000"/>
+              </a:lnSpc>
+            </a:pPr>
+            <a:endParaRPr/>
+          </a:p>
+          <a:p>
+            <a:pPr>
+              <a:lnSpc>
+                <a:spcPct val="90000"/>
+              </a:lnSpc>
+            </a:pPr>
+            <a:r>
+              <a:rPr lang="en-US" sz="2800">
+                <a:latin typeface="Lucida Console"/>
+              </a:rPr>
+              <a:t>print(frequencias)</a:t>
+            </a:r>
+            <a:endParaRPr/>
+          </a:p>
+          <a:p>
+            <a:pPr>
+              <a:lnSpc>
+                <a:spcPct val="90000"/>
+              </a:lnSpc>
+            </a:pPr>
+            <a:r>
+              <a:rPr lang="en-US" sz="2800">
+                <a:latin typeface="Lucida Console"/>
+              </a:rPr>
+              <a:t>[['Pidgeotto' '1']</a:t>
+            </a:r>
+            <a:endParaRPr/>
+          </a:p>
+          <a:p>
+            <a:pPr>
+              <a:lnSpc>
+                <a:spcPct val="90000"/>
+              </a:lnSpc>
+            </a:pPr>
+            <a:r>
+              <a:rPr lang="en-US" sz="2800">
+                <a:solidFill>
+                  <a:srgbClr val="000000"/>
+                </a:solidFill>
+                <a:latin typeface="Lucida console"/>
+              </a:rPr>
+              <a:t> </a:t>
+            </a:r>
+            <a:r>
+              <a:rPr lang="en-US" sz="2800">
+                <a:solidFill>
+                  <a:srgbClr val="000000"/>
+                </a:solidFill>
+                <a:latin typeface="Lucida console"/>
+              </a:rPr>
+              <a:t>['Pidgey' '5']</a:t>
+            </a:r>
+            <a:endParaRPr/>
+          </a:p>
+          <a:p>
+            <a:pPr>
+              <a:lnSpc>
+                <a:spcPct val="90000"/>
+              </a:lnSpc>
+            </a:pPr>
+            <a:r>
+              <a:rPr lang="en-US" sz="2800">
+                <a:solidFill>
+                  <a:srgbClr val="000000"/>
+                </a:solidFill>
+                <a:latin typeface="Lucida console"/>
+              </a:rPr>
+              <a:t> </a:t>
+            </a:r>
+            <a:r>
+              <a:rPr lang="en-US" sz="2800">
+                <a:solidFill>
+                  <a:srgbClr val="000000"/>
+                </a:solidFill>
+                <a:latin typeface="Lucida console"/>
+              </a:rPr>
+              <a:t>['Poliwag' '1']</a:t>
+            </a:r>
+            <a:endParaRPr/>
+          </a:p>
+          <a:p>
+            <a:pPr>
+              <a:lnSpc>
+                <a:spcPct val="90000"/>
+              </a:lnSpc>
+            </a:pPr>
+            <a:r>
+              <a:rPr lang="en-US" sz="2800">
+                <a:solidFill>
+                  <a:srgbClr val="000000"/>
+                </a:solidFill>
+                <a:latin typeface="Lucida console"/>
+              </a:rPr>
+              <a:t> </a:t>
+            </a:r>
+            <a:r>
+              <a:rPr lang="en-US" sz="2800">
+                <a:solidFill>
+                  <a:srgbClr val="000000"/>
+                </a:solidFill>
+                <a:latin typeface="Lucida console"/>
+              </a:rPr>
+              <a:t>['Rapidash' '1']</a:t>
+            </a:r>
+            <a:endParaRPr/>
+          </a:p>
+          <a:p>
+            <a:pPr>
+              <a:lnSpc>
+                <a:spcPct val="90000"/>
+              </a:lnSpc>
+            </a:pPr>
+            <a:r>
+              <a:rPr lang="en-US" sz="2800">
+                <a:solidFill>
+                  <a:srgbClr val="000000"/>
+                </a:solidFill>
+                <a:latin typeface="Lucida console"/>
+              </a:rPr>
+              <a:t> </a:t>
+            </a:r>
+            <a:r>
+              <a:rPr lang="en-US" sz="2800">
+                <a:solidFill>
+                  <a:srgbClr val="000000"/>
+                </a:solidFill>
+                <a:latin typeface="Lucida console"/>
+              </a:rPr>
+              <a:t>['Rattata' '2']</a:t>
+            </a:r>
+            <a:endParaRPr/>
+          </a:p>
+          <a:p>
+            <a:pPr>
+              <a:lnSpc>
+                <a:spcPct val="90000"/>
+              </a:lnSpc>
+            </a:pPr>
+            <a:r>
+              <a:rPr lang="en-US" sz="2800">
+                <a:solidFill>
+                  <a:srgbClr val="000000"/>
+                </a:solidFill>
+                <a:latin typeface="Lucida console"/>
+              </a:rPr>
+              <a:t> </a:t>
+            </a:r>
+            <a:r>
+              <a:rPr lang="en-US" sz="2800">
+                <a:solidFill>
+                  <a:srgbClr val="000000"/>
+                </a:solidFill>
+                <a:latin typeface="Lucida console"/>
+              </a:rPr>
+              <a:t>['Sandshrew' '2']]</a:t>
+            </a:r>
+            <a:endParaRPr/>
+          </a:p>
+          <a:p>
+            <a:pPr>
+              <a:lnSpc>
+                <a:spcPct val="90000"/>
+              </a:lnSpc>
+            </a:pPr>
+            <a:endParaRPr/>
+          </a:p>
+        </p:txBody>
+      </p:sp>
+    </p:spTree>
+  </p:cSld>
+  <p:timing>
+    <p:tnLst>
+      <p:par>
+        <p:cTn id="49" dur="indefinite" restart="never" nodeType="tmRoot">
+          <p:childTnLst>
+            <p:seq>
+              <p:cTn id="50" nodeType="mainSeq"/>
+              <p:prevCondLst>
+                <p:cond delay="0" evt="onPrev">
+                  <p:tgtEl>
+                    <p:sldTgt/>
+                  </p:tgtEl>
+                </p:cond>
+              </p:prevCondLst>
+              <p:nextCondLst>
+                <p:cond delay="0" evt="onNext">
+                  <p:tgtEl>
+                    <p:sldTgt/>
+                  </p:tgtEl>
+                </p:cond>
+              </p:nextCondLst>
+            </p:seq>
+          </p:childTnLst>
+        </p:cTn>
+      </p:par>
+    </p:tnLst>
+  </p:timing>
+</p:sld>
+</file>
+
+<file path=ppt/slides/slide26.xml><?xml version="1.0" encoding="utf-8"?>
+<p:sld xmlns:a="http://schemas.openxmlformats.org/drawingml/2006/main" xmlns:p="http://schemas.openxmlformats.org/presentationml/2006/main" xmlns:r="http://schemas.openxmlformats.org/officeDocument/2006/relationships">
+  <p:cSld>
+    <p:spTree>
+      <p:nvGrpSpPr>
+        <p:cNvPr id="1" name=""/>
+        <p:cNvGrpSpPr/>
+        <p:nvPr/>
+      </p:nvGrpSpPr>
+      <p:grpSpPr>
+        <a:xfrm>
+          <a:off x="0" y="0"/>
+          <a:ext cx="0" cy="0"/>
+          <a:chOff x="0" y="0"/>
+          <a:chExt cx="0" cy="0"/>
+        </a:xfrm>
+      </p:grpSpPr>
+      <p:sp>
+        <p:nvSpPr>
+          <p:cNvPr id="122" name="CustomShape 1"/>
+          <p:cNvSpPr/>
+          <p:nvPr/>
+        </p:nvSpPr>
+        <p:spPr>
+          <a:xfrm>
+            <a:off x="838080" y="365040"/>
+            <a:ext cx="10513800" cy="1323720"/>
+          </a:xfrm>
+          <a:prstGeom prst="rect">
+            <a:avLst/>
+          </a:prstGeom>
+          <a:noFill/>
+          <a:ln>
+            <a:noFill/>
+          </a:ln>
+        </p:spPr>
+        <p:txBody>
+          <a:bodyPr lIns="90000" rIns="90000" tIns="45000" bIns="45000" anchor="ctr"/>
+          <a:p>
+            <a:pPr>
+              <a:lnSpc>
+                <a:spcPct val="90000"/>
+              </a:lnSpc>
+            </a:pPr>
+            <a:r>
+              <a:rPr lang="en-US" sz="4400">
+                <a:solidFill>
+                  <a:srgbClr val="000000"/>
+                </a:solidFill>
+                <a:latin typeface="Calibri Light"/>
+              </a:rPr>
+              <a:t>Distribuição de Frequências</a:t>
+            </a:r>
+            <a:endParaRPr/>
+          </a:p>
+        </p:txBody>
+      </p:sp>
+      <p:sp>
+        <p:nvSpPr>
+          <p:cNvPr id="123" name="CustomShape 2"/>
+          <p:cNvSpPr/>
+          <p:nvPr/>
+        </p:nvSpPr>
+        <p:spPr>
+          <a:xfrm>
+            <a:off x="838080" y="1825560"/>
+            <a:ext cx="10513800" cy="4349520"/>
+          </a:xfrm>
+          <a:prstGeom prst="rect">
+            <a:avLst/>
+          </a:prstGeom>
+          <a:noFill/>
+          <a:ln>
+            <a:noFill/>
+          </a:ln>
+        </p:spPr>
+        <p:txBody>
+          <a:bodyPr lIns="90000" rIns="90000" tIns="45000" bIns="45000"/>
+          <a:p>
+            <a:pPr>
+              <a:lnSpc>
+                <a:spcPct val="100000"/>
+              </a:lnSpc>
+            </a:pPr>
+            <a:endParaRPr/>
+          </a:p>
+          <a:p>
+            <a:pPr>
+              <a:lnSpc>
+                <a:spcPct val="90000"/>
+              </a:lnSpc>
+            </a:pPr>
+            <a:r>
+              <a:rPr lang="en-US" sz="2800">
+                <a:solidFill>
+                  <a:srgbClr val="000000"/>
+                </a:solidFill>
+                <a:latin typeface="Lucida console"/>
+              </a:rPr>
+              <a:t>xi = frequencias[:, 0]</a:t>
+            </a:r>
+            <a:endParaRPr/>
+          </a:p>
+          <a:p>
+            <a:pPr>
+              <a:lnSpc>
+                <a:spcPct val="90000"/>
+              </a:lnSpc>
+            </a:pPr>
+            <a:r>
+              <a:rPr lang="en-US" sz="2800">
+                <a:solidFill>
+                  <a:srgbClr val="000000"/>
+                </a:solidFill>
+                <a:latin typeface="Lucida console"/>
+              </a:rPr>
+              <a:t>print(xi)</a:t>
+            </a:r>
+            <a:endParaRPr/>
+          </a:p>
+          <a:p>
+            <a:pPr>
+              <a:lnSpc>
+                <a:spcPct val="90000"/>
+              </a:lnSpc>
+            </a:pPr>
+            <a:r>
+              <a:rPr lang="en-US" sz="2800">
+                <a:solidFill>
+                  <a:srgbClr val="000000"/>
+                </a:solidFill>
+                <a:latin typeface="Lucida console"/>
+              </a:rPr>
+              <a:t>['Pidgeotto' 'Pidgey' 'Poliwag' 'Rapidash' 'Rattata' 'Sandshrew']</a:t>
+            </a:r>
+            <a:endParaRPr/>
+          </a:p>
+          <a:p>
+            <a:pPr>
+              <a:lnSpc>
+                <a:spcPct val="90000"/>
+              </a:lnSpc>
+            </a:pPr>
+            <a:endParaRPr/>
+          </a:p>
+          <a:p>
+            <a:pPr>
+              <a:lnSpc>
+                <a:spcPct val="90000"/>
+              </a:lnSpc>
+            </a:pPr>
+            <a:r>
+              <a:rPr lang="en-US" sz="2800">
+                <a:solidFill>
+                  <a:srgbClr val="000000"/>
+                </a:solidFill>
+                <a:latin typeface="Lucida console"/>
+              </a:rPr>
+              <a:t>fi = frequencias[:, 1]</a:t>
+            </a:r>
+            <a:endParaRPr/>
+          </a:p>
+          <a:p>
+            <a:pPr>
+              <a:lnSpc>
+                <a:spcPct val="90000"/>
+              </a:lnSpc>
+            </a:pPr>
+            <a:r>
+              <a:rPr lang="en-US" sz="2800">
+                <a:solidFill>
+                  <a:srgbClr val="000000"/>
+                </a:solidFill>
+                <a:latin typeface="Lucida console"/>
+              </a:rPr>
+              <a:t>print(fi)</a:t>
+            </a:r>
+            <a:endParaRPr/>
+          </a:p>
+          <a:p>
+            <a:pPr>
+              <a:lnSpc>
+                <a:spcPct val="90000"/>
+              </a:lnSpc>
+            </a:pPr>
+            <a:r>
+              <a:rPr lang="en-US" sz="2800">
+                <a:solidFill>
+                  <a:srgbClr val="000000"/>
+                </a:solidFill>
+                <a:latin typeface="Lucida console"/>
+              </a:rPr>
+              <a:t>[1 5 1 1 2 2]</a:t>
+            </a:r>
+            <a:endParaRPr/>
+          </a:p>
+          <a:p>
+            <a:pPr>
+              <a:lnSpc>
+                <a:spcPct val="90000"/>
+              </a:lnSpc>
+            </a:pPr>
+            <a:endParaRPr/>
+          </a:p>
+          <a:p>
+            <a:pPr>
+              <a:lnSpc>
+                <a:spcPct val="90000"/>
+              </a:lnSpc>
+            </a:pPr>
+            <a:r>
+              <a:rPr lang="en-US" sz="2800">
+                <a:solidFill>
+                  <a:srgbClr val="000000"/>
+                </a:solidFill>
+                <a:latin typeface="Lucida console"/>
+              </a:rPr>
+              <a:t># TODO explicação sobre fatiamento</a:t>
+            </a:r>
+            <a:endParaRPr/>
+          </a:p>
+        </p:txBody>
+      </p:sp>
+    </p:spTree>
+  </p:cSld>
+  <p:timing>
+    <p:tnLst>
+      <p:par>
+        <p:cTn id="51" dur="indefinite" restart="never" nodeType="tmRoot">
+          <p:childTnLst>
+            <p:seq>
+              <p:cTn id="52" nodeType="mainSeq"/>
+              <p:prevCondLst>
+                <p:cond delay="0" evt="onPrev">
+                  <p:tgtEl>
+                    <p:sldTgt/>
+                  </p:tgtEl>
+                </p:cond>
+              </p:prevCondLst>
+              <p:nextCondLst>
+                <p:cond delay="0" evt="onNext">
+                  <p:tgtEl>
+                    <p:sldTgt/>
+                  </p:tgtEl>
+                </p:cond>
+              </p:nextCondLst>
+            </p:seq>
+          </p:childTnLst>
+        </p:cTn>
+      </p:par>
+    </p:tnLst>
+  </p:timing>
+</p:sld>
+</file>
+
+<file path=ppt/slides/slide27.xml><?xml version="1.0" encoding="utf-8"?>
+<p:sld xmlns:a="http://schemas.openxmlformats.org/drawingml/2006/main" xmlns:p="http://schemas.openxmlformats.org/presentationml/2006/main" xmlns:r="http://schemas.openxmlformats.org/officeDocument/2006/relationships">
+  <p:cSld>
+    <p:spTree>
+      <p:nvGrpSpPr>
+        <p:cNvPr id="1" name=""/>
+        <p:cNvGrpSpPr/>
+        <p:nvPr/>
+      </p:nvGrpSpPr>
+      <p:grpSpPr>
+        <a:xfrm>
+          <a:off x="0" y="0"/>
+          <a:ext cx="0" cy="0"/>
+          <a:chOff x="0" y="0"/>
+          <a:chExt cx="0" cy="0"/>
+        </a:xfrm>
+      </p:grpSpPr>
+      <p:sp>
+        <p:nvSpPr>
+          <p:cNvPr id="124" name="CustomShape 1"/>
+          <p:cNvSpPr/>
+          <p:nvPr/>
+        </p:nvSpPr>
+        <p:spPr>
+          <a:xfrm>
+            <a:off x="838080" y="365040"/>
+            <a:ext cx="10513800" cy="1323720"/>
+          </a:xfrm>
+          <a:prstGeom prst="rect">
+            <a:avLst/>
+          </a:prstGeom>
+          <a:noFill/>
+          <a:ln>
+            <a:noFill/>
+          </a:ln>
+        </p:spPr>
+        <p:txBody>
+          <a:bodyPr lIns="90000" rIns="90000" tIns="45000" bIns="45000" anchor="ctr"/>
+          <a:p>
+            <a:pPr>
+              <a:lnSpc>
+                <a:spcPct val="90000"/>
+              </a:lnSpc>
+            </a:pPr>
+            <a:r>
+              <a:rPr lang="en-US" sz="4400">
+                <a:solidFill>
+                  <a:srgbClr val="000000"/>
+                </a:solidFill>
+                <a:latin typeface="Calibri Light"/>
+              </a:rPr>
+              <a:t>Visualização de dados</a:t>
+            </a:r>
+            <a:endParaRPr/>
+          </a:p>
+        </p:txBody>
+      </p:sp>
+      <p:sp>
+        <p:nvSpPr>
+          <p:cNvPr id="125" name="CustomShape 2"/>
+          <p:cNvSpPr/>
+          <p:nvPr/>
+        </p:nvSpPr>
+        <p:spPr>
+          <a:xfrm>
+            <a:off x="838080" y="1825560"/>
+            <a:ext cx="10513800" cy="4349520"/>
+          </a:xfrm>
+          <a:prstGeom prst="rect">
+            <a:avLst/>
+          </a:prstGeom>
+          <a:noFill/>
+          <a:ln>
+            <a:noFill/>
+          </a:ln>
+        </p:spPr>
+        <p:txBody>
+          <a:bodyPr lIns="90000" rIns="90000" tIns="45000" bIns="45000"/>
+          <a:p>
+            <a:pPr>
+              <a:lnSpc>
+                <a:spcPct val="100000"/>
+              </a:lnSpc>
+            </a:pPr>
+            <a:endParaRPr/>
+          </a:p>
+          <a:p>
+            <a:pPr>
+              <a:lnSpc>
+                <a:spcPct val="90000"/>
+              </a:lnSpc>
+            </a:pPr>
+            <a:r>
+              <a:rPr lang="en-US" sz="2800">
+                <a:solidFill>
+                  <a:srgbClr val="000000"/>
+                </a:solidFill>
+                <a:latin typeface="Lucida console"/>
+              </a:rPr>
+              <a:t>matplotlib</a:t>
+            </a:r>
+            <a:endParaRPr/>
+          </a:p>
+          <a:p>
+            <a:pPr>
+              <a:lnSpc>
+                <a:spcPct val="90000"/>
+              </a:lnSpc>
+            </a:pPr>
+            <a:endParaRPr/>
+          </a:p>
+          <a:p>
+            <a:pPr>
+              <a:lnSpc>
+                <a:spcPct val="90000"/>
+              </a:lnSpc>
+            </a:pPr>
+            <a:endParaRPr/>
+          </a:p>
+        </p:txBody>
+      </p:sp>
+    </p:spTree>
+  </p:cSld>
+  <p:timing>
+    <p:tnLst>
+      <p:par>
+        <p:cTn id="53" dur="indefinite" restart="never" nodeType="tmRoot">
+          <p:childTnLst>
+            <p:seq>
+              <p:cTn id="54" nodeType="mainSeq"/>
               <p:prevCondLst>
                 <p:cond delay="0" evt="onPrev">
                   <p:tgtEl>
@@ -5570,7 +6831,7 @@
         <p:spPr>
           <a:xfrm>
             <a:off x="838080" y="365040"/>
-            <a:ext cx="10514520" cy="1324440"/>
+            <a:ext cx="10513800" cy="1323720"/>
           </a:xfrm>
           <a:prstGeom prst="rect">
             <a:avLst/>
@@ -5610,7 +6871,7 @@
         <p:spPr>
           <a:xfrm>
             <a:off x="838080" y="1825560"/>
-            <a:ext cx="10514520" cy="4350240"/>
+            <a:ext cx="10513800" cy="4349520"/>
           </a:xfrm>
           <a:prstGeom prst="rect">
             <a:avLst/>
@@ -5782,7 +7043,7 @@
         <p:spPr>
           <a:xfrm>
             <a:off x="838080" y="365040"/>
-            <a:ext cx="10514520" cy="1324440"/>
+            <a:ext cx="10513800" cy="1323720"/>
           </a:xfrm>
           <a:prstGeom prst="rect">
             <a:avLst/>
@@ -5822,7 +7083,7 @@
         <p:spPr>
           <a:xfrm>
             <a:off x="838080" y="1825560"/>
-            <a:ext cx="10514520" cy="4350240"/>
+            <a:ext cx="10513800" cy="4349520"/>
           </a:xfrm>
           <a:prstGeom prst="rect">
             <a:avLst/>
@@ -5967,7 +7228,7 @@
         <p:spPr>
           <a:xfrm>
             <a:off x="838080" y="365040"/>
-            <a:ext cx="10514520" cy="1324440"/>
+            <a:ext cx="10513800" cy="1323720"/>
           </a:xfrm>
           <a:prstGeom prst="rect">
             <a:avLst/>
@@ -6013,7 +7274,7 @@
         <p:spPr>
           <a:xfrm>
             <a:off x="3945960" y="1427760"/>
-            <a:ext cx="3825720" cy="4916160"/>
+            <a:ext cx="3825000" cy="4915440"/>
           </a:xfrm>
           <a:prstGeom prst="rect">
             <a:avLst/>
@@ -6081,7 +7342,7 @@
         <p:spPr>
           <a:xfrm>
             <a:off x="838080" y="365040"/>
-            <a:ext cx="10514520" cy="1324440"/>
+            <a:ext cx="10513800" cy="1323720"/>
           </a:xfrm>
           <a:prstGeom prst="rect">
             <a:avLst/>
@@ -6121,7 +7382,7 @@
         <p:spPr>
           <a:xfrm>
             <a:off x="838080" y="1825560"/>
-            <a:ext cx="10514520" cy="4350240"/>
+            <a:ext cx="10513800" cy="4349520"/>
           </a:xfrm>
           <a:prstGeom prst="rect">
             <a:avLst/>
@@ -6337,7 +7598,7 @@
         <p:spPr>
           <a:xfrm>
             <a:off x="838080" y="365040"/>
-            <a:ext cx="10514520" cy="1324440"/>
+            <a:ext cx="10513800" cy="1323720"/>
           </a:xfrm>
           <a:prstGeom prst="rect">
             <a:avLst/>
@@ -6377,7 +7638,7 @@
         <p:spPr>
           <a:xfrm>
             <a:off x="838080" y="1825560"/>
-            <a:ext cx="10514520" cy="4350240"/>
+            <a:ext cx="10513800" cy="4349520"/>
           </a:xfrm>
           <a:prstGeom prst="rect">
             <a:avLst/>
@@ -6550,7 +7811,7 @@
         <p:spPr>
           <a:xfrm>
             <a:off x="838080" y="365040"/>
-            <a:ext cx="10514520" cy="1324440"/>
+            <a:ext cx="10513800" cy="1323720"/>
           </a:xfrm>
           <a:prstGeom prst="rect">
             <a:avLst/>
@@ -6590,7 +7851,7 @@
         <p:spPr>
           <a:xfrm>
             <a:off x="838080" y="1825560"/>
-            <a:ext cx="10514520" cy="4350240"/>
+            <a:ext cx="10513800" cy="4349520"/>
           </a:xfrm>
           <a:prstGeom prst="rect">
             <a:avLst/>
@@ -6738,7 +7999,7 @@
         <p:spPr>
           <a:xfrm>
             <a:off x="838080" y="365040"/>
-            <a:ext cx="10514520" cy="1324440"/>
+            <a:ext cx="10513800" cy="1323720"/>
           </a:xfrm>
           <a:prstGeom prst="rect">
             <a:avLst/>
@@ -6778,7 +8039,7 @@
         <p:spPr>
           <a:xfrm>
             <a:off x="838080" y="1825560"/>
-            <a:ext cx="10514520" cy="4350240"/>
+            <a:ext cx="10513800" cy="4349520"/>
           </a:xfrm>
           <a:prstGeom prst="rect">
             <a:avLst/>

</xml_diff>

<commit_message>
Added graph image to presentation
</commit_message>
<xml_diff>
--- a/presentation.pptx
+++ b/presentation.pptx
@@ -33,6 +33,7 @@
     <p:sldId id="280" r:id="rId27"/>
     <p:sldId id="281" r:id="rId28"/>
     <p:sldId id="282" r:id="rId29"/>
+    <p:sldId id="283" r:id="rId30"/>
   </p:sldIdLst>
   <p:sldSz cx="12192000" cy="6858000"/>
   <p:notesSz cx="7559675" cy="10691813"/>
@@ -13380,6 +13381,134 @@
         </p:txBody>
       </p:sp>
     </p:spTree>
+  </p:cSld>
+  <p:clrMapOvr>
+    <a:masterClrMapping/>
+  </p:clrMapOvr>
+  <p:timing>
+    <p:tnLst>
+      <p:par>
+        <p:cTn id="1" dur="indefinite" restart="never" nodeType="tmRoot">
+          <p:childTnLst>
+            <p:seq>
+              <p:cTn id="2" nodeType="mainSeq"/>
+              <p:prevCondLst>
+                <p:cond evt="onPrev" delay="0">
+                  <p:tgtEl>
+                    <p:sldTgt/>
+                  </p:tgtEl>
+                </p:cond>
+              </p:prevCondLst>
+              <p:nextCondLst>
+                <p:cond evt="onNext" delay="0">
+                  <p:tgtEl>
+                    <p:sldTgt/>
+                  </p:tgtEl>
+                </p:cond>
+              </p:nextCondLst>
+            </p:seq>
+          </p:childTnLst>
+        </p:cTn>
+      </p:par>
+    </p:tnLst>
+  </p:timing>
+</p:sld>
+</file>
+
+<file path=ppt/slides/slide28.xml><?xml version="1.0" encoding="utf-8"?>
+<p:sld xmlns:a="http://schemas.openxmlformats.org/drawingml/2006/main" xmlns:r="http://schemas.openxmlformats.org/officeDocument/2006/relationships" xmlns:p="http://schemas.openxmlformats.org/presentationml/2006/main">
+  <p:cSld>
+    <p:spTree>
+      <p:nvGrpSpPr>
+        <p:cNvPr id="1" name=""/>
+        <p:cNvGrpSpPr/>
+        <p:nvPr/>
+      </p:nvGrpSpPr>
+      <p:grpSpPr>
+        <a:xfrm>
+          <a:off x="0" y="0"/>
+          <a:ext cx="0" cy="0"/>
+          <a:chOff x="0" y="0"/>
+          <a:chExt cx="0" cy="0"/>
+        </a:xfrm>
+      </p:grpSpPr>
+      <p:sp>
+        <p:nvSpPr>
+          <p:cNvPr id="124" name="CustomShape 1"/>
+          <p:cNvSpPr/>
+          <p:nvPr/>
+        </p:nvSpPr>
+        <p:spPr>
+          <a:xfrm>
+            <a:off x="838080" y="365040"/>
+            <a:ext cx="10513440" cy="1323360"/>
+          </a:xfrm>
+          <a:prstGeom prst="rect">
+            <a:avLst/>
+          </a:prstGeom>
+          <a:noFill/>
+          <a:ln>
+            <a:noFill/>
+          </a:ln>
+        </p:spPr>
+        <p:txBody>
+          <a:bodyPr lIns="90000" tIns="45000" rIns="90000" bIns="45000" anchor="ctr"/>
+          <a:lstStyle/>
+          <a:p>
+            <a:pPr>
+              <a:lnSpc>
+                <a:spcPct val="90000"/>
+              </a:lnSpc>
+            </a:pPr>
+            <a:r>
+              <a:rPr lang="en-US" sz="4400">
+                <a:solidFill>
+                  <a:srgbClr val="000000"/>
+                </a:solidFill>
+                <a:latin typeface="Calibri Light"/>
+              </a:rPr>
+              <a:t>Visualização de dados</a:t>
+            </a:r>
+            <a:endParaRPr/>
+          </a:p>
+        </p:txBody>
+      </p:sp>
+      <p:pic>
+        <p:nvPicPr>
+          <p:cNvPr id="7" name="Imagem 6"/>
+          <p:cNvPicPr>
+            <a:picLocks noChangeAspect="1"/>
+          </p:cNvPicPr>
+          <p:nvPr/>
+        </p:nvPicPr>
+        <p:blipFill>
+          <a:blip r:embed="rId2">
+            <a:extLst>
+              <a:ext uri="{28A0092B-C50C-407E-A947-70E740481C1C}">
+                <a14:useLocalDpi xmlns:a14="http://schemas.microsoft.com/office/drawing/2010/main" val="0"/>
+              </a:ext>
+            </a:extLst>
+          </a:blip>
+          <a:stretch>
+            <a:fillRect/>
+          </a:stretch>
+        </p:blipFill>
+        <p:spPr>
+          <a:xfrm>
+            <a:off x="2167569" y="967153"/>
+            <a:ext cx="7854462" cy="5890847"/>
+          </a:xfrm>
+          <a:prstGeom prst="rect">
+            <a:avLst/>
+          </a:prstGeom>
+        </p:spPr>
+      </p:pic>
+    </p:spTree>
+    <p:extLst>
+      <p:ext uri="{BB962C8B-B14F-4D97-AF65-F5344CB8AC3E}">
+        <p14:creationId xmlns:p14="http://schemas.microsoft.com/office/powerpoint/2010/main" val="1109311291"/>
+      </p:ext>
+    </p:extLst>
   </p:cSld>
   <p:clrMapOvr>
     <a:masterClrMapping/>

</xml_diff>

<commit_message>
Separated instructions in the slides
</commit_message>
<xml_diff>
--- a/presentation.pptx
+++ b/presentation.pptx
@@ -33,7 +33,9 @@
     <p:sldId id="280" r:id="rId27"/>
     <p:sldId id="281" r:id="rId28"/>
     <p:sldId id="282" r:id="rId29"/>
-    <p:sldId id="283" r:id="rId30"/>
+    <p:sldId id="284" r:id="rId30"/>
+    <p:sldId id="285" r:id="rId31"/>
+    <p:sldId id="286" r:id="rId32"/>
   </p:sldIdLst>
   <p:sldSz cx="12192000" cy="6858000"/>
   <p:notesSz cx="7559675" cy="10691813"/>
@@ -132,6 +134,11 @@
       </a:defRPr>
     </a:lvl9pPr>
   </p:defaultTextStyle>
+  <p:extLst>
+    <p:ext uri="{EFAFB233-063F-42B5-8137-9DF3F51BA10A}">
+      <p15:sldGuideLst xmlns:p15="http://schemas.microsoft.com/office/powerpoint/2012/main"/>
+    </p:ext>
+  </p:extLst>
 </p:presentation>
 </file>
 
@@ -12710,15 +12717,24 @@
               </a:lnSpc>
             </a:pPr>
             <a:r>
-              <a:rPr lang="en-US" sz="4400">
+              <a:rPr lang="en-US" sz="4400" dirty="0" err="1">
                 <a:solidFill>
                   <a:srgbClr val="000000"/>
                 </a:solidFill>
                 <a:latin typeface="Calibri Light"/>
               </a:rPr>
-              <a:t>Visualização de dados</a:t>
-            </a:r>
-            <a:endParaRPr/>
+              <a:t>Visualização</a:t>
+            </a:r>
+            <a:r>
+              <a:rPr lang="en-US" sz="4400" dirty="0">
+                <a:solidFill>
+                  <a:srgbClr val="000000"/>
+                </a:solidFill>
+                <a:latin typeface="Calibri Light"/>
+              </a:rPr>
+              <a:t> de dados</a:t>
+            </a:r>
+            <a:endParaRPr dirty="0"/>
           </a:p>
         </p:txBody>
       </p:sp>
@@ -12731,7 +12747,7 @@
         <p:spPr>
           <a:xfrm>
             <a:off x="838080" y="1688399"/>
-            <a:ext cx="9979975" cy="3293209"/>
+            <a:ext cx="9979975" cy="2492990"/>
           </a:xfrm>
           <a:prstGeom prst="rect">
             <a:avLst/>
@@ -12847,7 +12863,7 @@
               <a:t> </a:t>
             </a:r>
             <a:r>
-              <a:rPr lang="pt-BR" sz="2600" b="1" i="0" dirty="0">
+              <a:rPr lang="pt-BR" sz="2600" b="1" i="0" dirty="0" err="1">
                 <a:solidFill>
                   <a:srgbClr val="0000FF"/>
                 </a:solidFill>
@@ -12856,6 +12872,15 @@
               </a:rPr>
               <a:t>plt</a:t>
             </a:r>
+            <a:endParaRPr lang="pt-BR" sz="2600" b="1" i="0" dirty="0">
+              <a:solidFill>
+                <a:srgbClr val="0000FF"/>
+              </a:solidFill>
+              <a:effectLst/>
+              <a:latin typeface="Lucida Console" panose="020B0609040504020204" pitchFamily="49" charset="0"/>
+            </a:endParaRPr>
+          </a:p>
+          <a:p>
             <a:endParaRPr lang="pt-BR" sz="2600" dirty="0">
               <a:solidFill>
                 <a:srgbClr val="333333"/>
@@ -12872,17 +12897,44 @@
                 <a:effectLst/>
                 <a:latin typeface="Lucida Console" panose="020B0609040504020204" pitchFamily="49" charset="0"/>
               </a:rPr>
-              <a:t>x_pos </a:t>
-            </a:r>
-            <a:r>
-              <a:rPr lang="pt-BR" sz="2600" b="0" i="0" dirty="0">
-                <a:solidFill>
-                  <a:srgbClr val="666666"/>
+              <a:t>tamanho = </a:t>
+            </a:r>
+            <a:r>
+              <a:rPr lang="pt-BR" sz="2600" dirty="0" err="1">
+                <a:solidFill>
+                  <a:srgbClr val="008000"/>
+                </a:solidFill>
+                <a:latin typeface="Lucida Console" panose="020B0609040504020204" pitchFamily="49" charset="0"/>
+              </a:rPr>
+              <a:t>len</a:t>
+            </a:r>
+            <a:r>
+              <a:rPr lang="pt-BR" sz="2600" dirty="0">
+                <a:solidFill>
+                  <a:srgbClr val="333333"/>
+                </a:solidFill>
+                <a:latin typeface="Lucida Console" panose="020B0609040504020204" pitchFamily="49" charset="0"/>
+              </a:rPr>
+              <a:t>(xi)</a:t>
+            </a:r>
+            <a:endParaRPr lang="pt-BR" sz="2600" b="0" i="0" dirty="0">
+              <a:solidFill>
+                <a:srgbClr val="333333"/>
+              </a:solidFill>
+              <a:effectLst/>
+              <a:latin typeface="Lucida Console" panose="020B0609040504020204" pitchFamily="49" charset="0"/>
+            </a:endParaRPr>
+          </a:p>
+          <a:p>
+            <a:r>
+              <a:rPr lang="pt-BR" sz="2600" b="0" i="0" dirty="0" err="1">
+                <a:solidFill>
+                  <a:srgbClr val="333333"/>
                 </a:solidFill>
                 <a:effectLst/>
                 <a:latin typeface="Lucida Console" panose="020B0609040504020204" pitchFamily="49" charset="0"/>
               </a:rPr>
-              <a:t>=</a:t>
+              <a:t>x_pos</a:t>
             </a:r>
             <a:r>
               <a:rPr lang="pt-BR" sz="2600" b="0" i="0" dirty="0">
@@ -12892,7 +12944,7 @@
                 <a:effectLst/>
                 <a:latin typeface="Lucida Console" panose="020B0609040504020204" pitchFamily="49" charset="0"/>
               </a:rPr>
-              <a:t> np</a:t>
+              <a:t> </a:t>
             </a:r>
             <a:r>
               <a:rPr lang="pt-BR" sz="2600" b="0" i="0" dirty="0">
@@ -12902,7 +12954,7 @@
                 <a:effectLst/>
                 <a:latin typeface="Lucida Console" panose="020B0609040504020204" pitchFamily="49" charset="0"/>
               </a:rPr>
-              <a:t>.</a:t>
+              <a:t>=</a:t>
             </a:r>
             <a:r>
               <a:rPr lang="pt-BR" sz="2600" b="0" i="0" dirty="0">
@@ -12912,30 +12964,28 @@
                 <a:effectLst/>
                 <a:latin typeface="Lucida Console" panose="020B0609040504020204" pitchFamily="49" charset="0"/>
               </a:rPr>
-              <a:t>arange(</a:t>
+              <a:t> </a:t>
             </a:r>
             <a:r>
               <a:rPr lang="pt-BR" sz="2600" b="0" i="0" dirty="0" err="1">
                 <a:solidFill>
-                  <a:srgbClr val="008000"/>
+                  <a:srgbClr val="333333"/>
                 </a:solidFill>
                 <a:effectLst/>
                 <a:latin typeface="Lucida Console" panose="020B0609040504020204" pitchFamily="49" charset="0"/>
               </a:rPr>
-              <a:t>len</a:t>
-            </a:r>
-            <a:r>
-              <a:rPr lang="pt-BR" sz="2600" b="0" i="0" dirty="0">
-                <a:solidFill>
-                  <a:srgbClr val="333333"/>
+              <a:t>np</a:t>
+            </a:r>
+            <a:r>
+              <a:rPr lang="pt-BR" sz="2600" b="0" i="0" dirty="0" err="1">
+                <a:solidFill>
+                  <a:srgbClr val="666666"/>
                 </a:solidFill>
                 <a:effectLst/>
                 <a:latin typeface="Lucida Console" panose="020B0609040504020204" pitchFamily="49" charset="0"/>
               </a:rPr>
-              <a:t>(xi))</a:t>
-            </a:r>
-          </a:p>
-          <a:p>
+              <a:t>.</a:t>
+            </a:r>
             <a:r>
               <a:rPr lang="pt-BR" sz="2600" b="0" i="0" dirty="0" err="1">
                 <a:solidFill>
@@ -12944,18 +12994,20 @@
                 <a:effectLst/>
                 <a:latin typeface="Lucida Console" panose="020B0609040504020204" pitchFamily="49" charset="0"/>
               </a:rPr>
-              <a:t>plt</a:t>
-            </a:r>
-            <a:r>
-              <a:rPr lang="pt-BR" sz="2600" b="0" i="0" dirty="0" err="1">
-                <a:solidFill>
-                  <a:srgbClr val="666666"/>
+              <a:t>arange</a:t>
+            </a:r>
+            <a:r>
+              <a:rPr lang="pt-BR" sz="2600" b="0" i="0" dirty="0">
+                <a:solidFill>
+                  <a:srgbClr val="333333"/>
                 </a:solidFill>
                 <a:effectLst/>
                 <a:latin typeface="Lucida Console" panose="020B0609040504020204" pitchFamily="49" charset="0"/>
               </a:rPr>
-              <a:t>.</a:t>
-            </a:r>
+              <a:t>(tamanho)</a:t>
+            </a:r>
+          </a:p>
+          <a:p>
             <a:r>
               <a:rPr lang="pt-BR" sz="2600" b="0" i="0" dirty="0" err="1">
                 <a:solidFill>
@@ -12964,27 +13016,27 @@
                 <a:effectLst/>
                 <a:latin typeface="Lucida Console" panose="020B0609040504020204" pitchFamily="49" charset="0"/>
               </a:rPr>
-              <a:t>figure</a:t>
-            </a:r>
-            <a:r>
-              <a:rPr lang="pt-BR" sz="2600" b="0" i="0" dirty="0">
-                <a:solidFill>
-                  <a:srgbClr val="333333"/>
+              <a:t>plt</a:t>
+            </a:r>
+            <a:r>
+              <a:rPr lang="pt-BR" sz="2600" b="0" i="0" dirty="0" err="1">
+                <a:solidFill>
+                  <a:srgbClr val="666666"/>
                 </a:solidFill>
                 <a:effectLst/>
                 <a:latin typeface="Lucida Console" panose="020B0609040504020204" pitchFamily="49" charset="0"/>
               </a:rPr>
-              <a:t>(</a:t>
-            </a:r>
-            <a:r>
-              <a:rPr lang="pt-BR" sz="2600" b="0" i="0" dirty="0">
-                <a:solidFill>
-                  <a:srgbClr val="666666"/>
+              <a:t>.</a:t>
+            </a:r>
+            <a:r>
+              <a:rPr lang="pt-BR" sz="2600" b="0" i="0" dirty="0" err="1">
+                <a:solidFill>
+                  <a:srgbClr val="333333"/>
                 </a:solidFill>
                 <a:effectLst/>
                 <a:latin typeface="Lucida Console" panose="020B0609040504020204" pitchFamily="49" charset="0"/>
               </a:rPr>
-              <a:t>1</a:t>
+              <a:t>bar</a:t>
             </a:r>
             <a:r>
               <a:rPr lang="pt-BR" sz="2600" b="0" i="0" dirty="0">
@@ -12994,389 +13046,88 @@
                 <a:effectLst/>
                 <a:latin typeface="Lucida Console" panose="020B0609040504020204" pitchFamily="49" charset="0"/>
               </a:rPr>
-              <a:t>)</a:t>
-            </a:r>
-          </a:p>
-          <a:p>
-            <a:r>
-              <a:rPr lang="pt-BR" sz="2600" b="0" i="0" dirty="0">
+              <a:t>(</a:t>
+            </a:r>
+            <a:r>
+              <a:rPr lang="pt-BR" sz="2600" b="0" i="0" dirty="0" err="1">
                 <a:solidFill>
                   <a:srgbClr val="333333"/>
                 </a:solidFill>
                 <a:effectLst/>
                 <a:latin typeface="Lucida Console" panose="020B0609040504020204" pitchFamily="49" charset="0"/>
               </a:rPr>
-              <a:t>plt</a:t>
+              <a:t>x_pos</a:t>
             </a:r>
             <a:r>
               <a:rPr lang="pt-BR" sz="2600" b="0" i="0" dirty="0">
                 <a:solidFill>
-                  <a:srgbClr val="666666"/>
+                  <a:srgbClr val="333333"/>
                 </a:solidFill>
                 <a:effectLst/>
                 <a:latin typeface="Lucida Console" panose="020B0609040504020204" pitchFamily="49" charset="0"/>
               </a:rPr>
-              <a:t>.</a:t>
-            </a:r>
-            <a:r>
-              <a:rPr lang="pt-BR" sz="2600" b="0" i="0" dirty="0">
+              <a:t>, </a:t>
+            </a:r>
+            <a:r>
+              <a:rPr lang="pt-BR" sz="2600" b="0" i="0" dirty="0" err="1">
                 <a:solidFill>
                   <a:srgbClr val="333333"/>
                 </a:solidFill>
                 <a:effectLst/>
                 <a:latin typeface="Lucida Console" panose="020B0609040504020204" pitchFamily="49" charset="0"/>
               </a:rPr>
-              <a:t>bar(x_pos, </a:t>
-            </a:r>
-            <a:r>
-              <a:rPr lang="pt-BR" sz="2600" b="0" i="0" dirty="0" err="1">
+              <a:t>fi</a:t>
+            </a:r>
+            <a:r>
+              <a:rPr lang="pt-BR" sz="2600" b="0" i="0" dirty="0">
                 <a:solidFill>
                   <a:srgbClr val="333333"/>
                 </a:solidFill>
                 <a:effectLst/>
                 <a:latin typeface="Lucida Console" panose="020B0609040504020204" pitchFamily="49" charset="0"/>
               </a:rPr>
-              <a:t>fi</a:t>
-            </a:r>
-            <a:r>
-              <a:rPr lang="pt-BR" sz="2600" b="0" i="0" dirty="0">
+              <a:t>, </a:t>
+            </a:r>
+            <a:r>
+              <a:rPr lang="pt-BR" sz="2600" b="0" i="0" dirty="0" err="1">
                 <a:solidFill>
                   <a:srgbClr val="333333"/>
                 </a:solidFill>
                 <a:effectLst/>
                 <a:latin typeface="Lucida Console" panose="020B0609040504020204" pitchFamily="49" charset="0"/>
               </a:rPr>
-              <a:t>, </a:t>
-            </a:r>
-            <a:r>
-              <a:rPr lang="pt-BR" sz="2600" b="0" i="0" dirty="0" err="1">
-                <a:solidFill>
-                  <a:srgbClr val="333333"/>
+              <a:t>align</a:t>
+            </a:r>
+            <a:r>
+              <a:rPr lang="pt-BR" sz="2600" b="0" i="0" dirty="0">
+                <a:solidFill>
+                  <a:srgbClr val="666666"/>
                 </a:solidFill>
                 <a:effectLst/>
                 <a:latin typeface="Lucida Console" panose="020B0609040504020204" pitchFamily="49" charset="0"/>
               </a:rPr>
-              <a:t>align</a:t>
+              <a:t>=</a:t>
             </a:r>
             <a:r>
               <a:rPr lang="pt-BR" sz="2600" b="0" i="0" dirty="0">
                 <a:solidFill>
-                  <a:srgbClr val="666666"/>
+                  <a:srgbClr val="BA2121"/>
                 </a:solidFill>
                 <a:effectLst/>
                 <a:latin typeface="Lucida Console" panose="020B0609040504020204" pitchFamily="49" charset="0"/>
               </a:rPr>
-              <a:t>=</a:t>
+              <a:t>'center'</a:t>
             </a:r>
             <a:r>
               <a:rPr lang="pt-BR" sz="2600" b="0" i="0" dirty="0">
                 <a:solidFill>
-                  <a:srgbClr val="BA2121"/>
+                  <a:srgbClr val="333333"/>
                 </a:solidFill>
                 <a:effectLst/>
                 <a:latin typeface="Lucida Console" panose="020B0609040504020204" pitchFamily="49" charset="0"/>
               </a:rPr>
-              <a:t>'center'</a:t>
-            </a:r>
-            <a:r>
-              <a:rPr lang="pt-BR" sz="2600" b="0" i="0" dirty="0">
-                <a:solidFill>
-                  <a:srgbClr val="333333"/>
-                </a:solidFill>
-                <a:effectLst/>
-                <a:latin typeface="Lucida Console" panose="020B0609040504020204" pitchFamily="49" charset="0"/>
-              </a:rPr>
               <a:t>)</a:t>
             </a:r>
-          </a:p>
-          <a:p>
-            <a:r>
-              <a:rPr lang="pt-BR" sz="2600" b="0" i="0" dirty="0" err="1">
-                <a:solidFill>
-                  <a:srgbClr val="333333"/>
-                </a:solidFill>
-                <a:effectLst/>
-                <a:latin typeface="Lucida Console" panose="020B0609040504020204" pitchFamily="49" charset="0"/>
-              </a:rPr>
-              <a:t>plt</a:t>
-            </a:r>
-            <a:r>
-              <a:rPr lang="pt-BR" sz="2600" b="0" i="0" dirty="0" err="1">
-                <a:solidFill>
-                  <a:srgbClr val="666666"/>
-                </a:solidFill>
-                <a:effectLst/>
-                <a:latin typeface="Lucida Console" panose="020B0609040504020204" pitchFamily="49" charset="0"/>
-              </a:rPr>
-              <a:t>.</a:t>
-            </a:r>
-            <a:r>
-              <a:rPr lang="pt-BR" sz="2600" b="0" i="0" dirty="0" err="1">
-                <a:solidFill>
-                  <a:srgbClr val="333333"/>
-                </a:solidFill>
-                <a:effectLst/>
-                <a:latin typeface="Lucida Console" panose="020B0609040504020204" pitchFamily="49" charset="0"/>
-              </a:rPr>
-              <a:t>ylim</a:t>
-            </a:r>
-            <a:r>
-              <a:rPr lang="pt-BR" sz="2600" b="0" i="0" dirty="0">
-                <a:solidFill>
-                  <a:srgbClr val="333333"/>
-                </a:solidFill>
-                <a:effectLst/>
-                <a:latin typeface="Lucida Console" panose="020B0609040504020204" pitchFamily="49" charset="0"/>
-              </a:rPr>
-              <a:t>(</a:t>
-            </a:r>
-            <a:r>
-              <a:rPr lang="pt-BR" sz="2600" b="0" i="0" dirty="0">
-                <a:solidFill>
-                  <a:srgbClr val="666666"/>
-                </a:solidFill>
-                <a:effectLst/>
-                <a:latin typeface="Lucida Console" panose="020B0609040504020204" pitchFamily="49" charset="0"/>
-              </a:rPr>
-              <a:t>0</a:t>
-            </a:r>
-            <a:r>
-              <a:rPr lang="pt-BR" sz="2600" b="0" i="0" dirty="0">
-                <a:solidFill>
-                  <a:srgbClr val="333333"/>
-                </a:solidFill>
-                <a:effectLst/>
-                <a:latin typeface="Lucida Console" panose="020B0609040504020204" pitchFamily="49" charset="0"/>
-              </a:rPr>
-              <a:t>, </a:t>
-            </a:r>
-            <a:r>
-              <a:rPr lang="pt-BR" sz="2600" b="0" i="0" dirty="0" err="1">
-                <a:solidFill>
-                  <a:srgbClr val="008000"/>
-                </a:solidFill>
-                <a:effectLst/>
-                <a:latin typeface="Lucida Console" panose="020B0609040504020204" pitchFamily="49" charset="0"/>
-              </a:rPr>
-              <a:t>max</a:t>
-            </a:r>
-            <a:r>
-              <a:rPr lang="pt-BR" sz="2600" b="0" i="0" dirty="0">
-                <a:solidFill>
-                  <a:srgbClr val="333333"/>
-                </a:solidFill>
-                <a:effectLst/>
-                <a:latin typeface="Lucida Console" panose="020B0609040504020204" pitchFamily="49" charset="0"/>
-              </a:rPr>
-              <a:t>(</a:t>
-            </a:r>
-            <a:r>
-              <a:rPr lang="pt-BR" sz="2600" b="0" i="0" dirty="0" err="1">
-                <a:solidFill>
-                  <a:srgbClr val="333333"/>
-                </a:solidFill>
-                <a:effectLst/>
-                <a:latin typeface="Lucida Console" panose="020B0609040504020204" pitchFamily="49" charset="0"/>
-              </a:rPr>
-              <a:t>fi</a:t>
-            </a:r>
-            <a:r>
-              <a:rPr lang="pt-BR" sz="2600" b="0" i="0" dirty="0">
-                <a:solidFill>
-                  <a:srgbClr val="333333"/>
-                </a:solidFill>
-                <a:effectLst/>
-                <a:latin typeface="Lucida Console" panose="020B0609040504020204" pitchFamily="49" charset="0"/>
-              </a:rPr>
-              <a:t>) </a:t>
-            </a:r>
-            <a:r>
-              <a:rPr lang="pt-BR" sz="2600" b="0" i="0" dirty="0">
-                <a:solidFill>
-                  <a:srgbClr val="666666"/>
-                </a:solidFill>
-                <a:effectLst/>
-                <a:latin typeface="Lucida Console" panose="020B0609040504020204" pitchFamily="49" charset="0"/>
-              </a:rPr>
-              <a:t>+</a:t>
-            </a:r>
-            <a:r>
-              <a:rPr lang="pt-BR" sz="2600" b="0" i="0" dirty="0">
-                <a:solidFill>
-                  <a:srgbClr val="333333"/>
-                </a:solidFill>
-                <a:effectLst/>
-                <a:latin typeface="Lucida Console" panose="020B0609040504020204" pitchFamily="49" charset="0"/>
-              </a:rPr>
-              <a:t> </a:t>
-            </a:r>
-            <a:r>
-              <a:rPr lang="pt-BR" sz="2600" b="0" i="0" dirty="0">
-                <a:solidFill>
-                  <a:srgbClr val="666666"/>
-                </a:solidFill>
-                <a:effectLst/>
-                <a:latin typeface="Lucida Console" panose="020B0609040504020204" pitchFamily="49" charset="0"/>
-              </a:rPr>
-              <a:t>0.5</a:t>
-            </a:r>
-            <a:r>
-              <a:rPr lang="pt-BR" sz="2600" b="0" i="0" dirty="0">
-                <a:solidFill>
-                  <a:srgbClr val="333333"/>
-                </a:solidFill>
-                <a:effectLst/>
-                <a:latin typeface="Lucida Console" panose="020B0609040504020204" pitchFamily="49" charset="0"/>
-              </a:rPr>
-              <a:t>)</a:t>
-            </a:r>
-          </a:p>
-          <a:p>
-            <a:r>
-              <a:rPr lang="pt-BR" sz="2600" b="0" i="0" dirty="0" err="1">
-                <a:solidFill>
-                  <a:srgbClr val="333333"/>
-                </a:solidFill>
-                <a:effectLst/>
-                <a:latin typeface="Lucida Console" panose="020B0609040504020204" pitchFamily="49" charset="0"/>
-              </a:rPr>
-              <a:t>plt</a:t>
-            </a:r>
-            <a:r>
-              <a:rPr lang="pt-BR" sz="2600" b="0" i="0" dirty="0" err="1">
-                <a:solidFill>
-                  <a:srgbClr val="666666"/>
-                </a:solidFill>
-                <a:effectLst/>
-                <a:latin typeface="Lucida Console" panose="020B0609040504020204" pitchFamily="49" charset="0"/>
-              </a:rPr>
-              <a:t>.</a:t>
-            </a:r>
-            <a:r>
-              <a:rPr lang="pt-BR" sz="2600" b="0" i="0" dirty="0" err="1">
-                <a:solidFill>
-                  <a:srgbClr val="333333"/>
-                </a:solidFill>
-                <a:effectLst/>
-                <a:latin typeface="Lucida Console" panose="020B0609040504020204" pitchFamily="49" charset="0"/>
-              </a:rPr>
-              <a:t>xticks</a:t>
-            </a:r>
-            <a:r>
-              <a:rPr lang="pt-BR" sz="2600" b="0" i="0" dirty="0">
-                <a:solidFill>
-                  <a:srgbClr val="333333"/>
-                </a:solidFill>
-                <a:effectLst/>
-                <a:latin typeface="Lucida Console" panose="020B0609040504020204" pitchFamily="49" charset="0"/>
-              </a:rPr>
-              <a:t>(</a:t>
-            </a:r>
-            <a:r>
-              <a:rPr lang="pt-BR" sz="2600" b="0" i="0" dirty="0" err="1">
-                <a:solidFill>
-                  <a:srgbClr val="333333"/>
-                </a:solidFill>
-                <a:effectLst/>
-                <a:latin typeface="Lucida Console" panose="020B0609040504020204" pitchFamily="49" charset="0"/>
-              </a:rPr>
-              <a:t>np</a:t>
-            </a:r>
-            <a:r>
-              <a:rPr lang="pt-BR" sz="2600" b="0" i="0" dirty="0" err="1">
-                <a:solidFill>
-                  <a:srgbClr val="666666"/>
-                </a:solidFill>
-                <a:effectLst/>
-                <a:latin typeface="Lucida Console" panose="020B0609040504020204" pitchFamily="49" charset="0"/>
-              </a:rPr>
-              <a:t>.</a:t>
-            </a:r>
-            <a:r>
-              <a:rPr lang="pt-BR" sz="2600" b="0" i="0" dirty="0" err="1">
-                <a:solidFill>
-                  <a:srgbClr val="333333"/>
-                </a:solidFill>
-                <a:effectLst/>
-                <a:latin typeface="Lucida Console" panose="020B0609040504020204" pitchFamily="49" charset="0"/>
-              </a:rPr>
-              <a:t>arange</a:t>
-            </a:r>
-            <a:r>
-              <a:rPr lang="pt-BR" sz="2600" b="0" i="0" dirty="0">
-                <a:solidFill>
-                  <a:srgbClr val="333333"/>
-                </a:solidFill>
-                <a:effectLst/>
-                <a:latin typeface="Lucida Console" panose="020B0609040504020204" pitchFamily="49" charset="0"/>
-              </a:rPr>
-              <a:t>(</a:t>
-            </a:r>
-            <a:r>
-              <a:rPr lang="pt-BR" sz="2600" b="0" i="0" dirty="0" err="1">
-                <a:solidFill>
-                  <a:srgbClr val="008000"/>
-                </a:solidFill>
-                <a:effectLst/>
-                <a:latin typeface="Lucida Console" panose="020B0609040504020204" pitchFamily="49" charset="0"/>
-              </a:rPr>
-              <a:t>len</a:t>
-            </a:r>
-            <a:r>
-              <a:rPr lang="pt-BR" sz="2600" b="0" i="0" dirty="0">
-                <a:solidFill>
-                  <a:srgbClr val="333333"/>
-                </a:solidFill>
-                <a:effectLst/>
-                <a:latin typeface="Lucida Console" panose="020B0609040504020204" pitchFamily="49" charset="0"/>
-              </a:rPr>
-              <a:t>(xi)), xi)</a:t>
-            </a:r>
-          </a:p>
-          <a:p>
-            <a:r>
-              <a:rPr lang="pt-BR" sz="2600" b="0" i="0" dirty="0" err="1">
-                <a:solidFill>
-                  <a:srgbClr val="333333"/>
-                </a:solidFill>
-                <a:effectLst/>
-                <a:latin typeface="Lucida Console" panose="020B0609040504020204" pitchFamily="49" charset="0"/>
-              </a:rPr>
-              <a:t>plt</a:t>
-            </a:r>
-            <a:r>
-              <a:rPr lang="pt-BR" sz="2600" b="0" i="0" dirty="0" err="1">
-                <a:solidFill>
-                  <a:srgbClr val="666666"/>
-                </a:solidFill>
-                <a:effectLst/>
-                <a:latin typeface="Lucida Console" panose="020B0609040504020204" pitchFamily="49" charset="0"/>
-              </a:rPr>
-              <a:t>.</a:t>
-            </a:r>
-            <a:r>
-              <a:rPr lang="pt-BR" sz="2600" b="0" i="0" dirty="0" err="1">
-                <a:solidFill>
-                  <a:srgbClr val="333333"/>
-                </a:solidFill>
-                <a:effectLst/>
-                <a:latin typeface="Lucida Console" panose="020B0609040504020204" pitchFamily="49" charset="0"/>
-              </a:rPr>
-              <a:t>show</a:t>
-            </a:r>
-            <a:r>
-              <a:rPr lang="pt-BR" sz="2600" b="0" i="0" dirty="0">
-                <a:solidFill>
-                  <a:srgbClr val="333333"/>
-                </a:solidFill>
-                <a:effectLst/>
-                <a:latin typeface="Lucida Console" panose="020B0609040504020204" pitchFamily="49" charset="0"/>
-              </a:rPr>
-              <a:t>()</a:t>
-            </a:r>
-            <a:endParaRPr lang="pt-BR" sz="2600" dirty="0">
-              <a:latin typeface="Lucida Console" panose="020B0609040504020204" pitchFamily="49" charset="0"/>
-            </a:endParaRPr>
           </a:p>
         </p:txBody>
       </p:sp>
@@ -13461,21 +13212,30 @@
               </a:lnSpc>
             </a:pPr>
             <a:r>
-              <a:rPr lang="en-US" sz="4400">
+              <a:rPr lang="en-US" sz="4400" dirty="0" err="1">
                 <a:solidFill>
                   <a:srgbClr val="000000"/>
                 </a:solidFill>
                 <a:latin typeface="Calibri Light"/>
               </a:rPr>
-              <a:t>Visualização de dados</a:t>
-            </a:r>
-            <a:endParaRPr/>
+              <a:t>Visualização</a:t>
+            </a:r>
+            <a:r>
+              <a:rPr lang="en-US" sz="4400" dirty="0">
+                <a:solidFill>
+                  <a:srgbClr val="000000"/>
+                </a:solidFill>
+                <a:latin typeface="Calibri Light"/>
+              </a:rPr>
+              <a:t> de dados</a:t>
+            </a:r>
+            <a:endParaRPr dirty="0"/>
           </a:p>
         </p:txBody>
       </p:sp>
       <p:pic>
         <p:nvPicPr>
-          <p:cNvPr id="7" name="Imagem 6"/>
+          <p:cNvPr id="2" name="Imagem 1"/>
           <p:cNvPicPr>
             <a:picLocks noChangeAspect="1"/>
           </p:cNvPicPr>
@@ -13495,8 +13255,8 @@
         </p:blipFill>
         <p:spPr>
           <a:xfrm>
-            <a:off x="2167569" y="967153"/>
-            <a:ext cx="7854462" cy="5890847"/>
+            <a:off x="2329542" y="1365068"/>
+            <a:ext cx="7023463" cy="5267597"/>
           </a:xfrm>
           <a:prstGeom prst="rect">
             <a:avLst/>
@@ -13506,7 +13266,258 @@
     </p:spTree>
     <p:extLst>
       <p:ext uri="{BB962C8B-B14F-4D97-AF65-F5344CB8AC3E}">
-        <p14:creationId xmlns:p14="http://schemas.microsoft.com/office/powerpoint/2010/main" val="1109311291"/>
+        <p14:creationId xmlns:p14="http://schemas.microsoft.com/office/powerpoint/2010/main" val="2743101261"/>
+      </p:ext>
+    </p:extLst>
+  </p:cSld>
+  <p:clrMapOvr>
+    <a:masterClrMapping/>
+  </p:clrMapOvr>
+  <p:timing>
+    <p:tnLst>
+      <p:par>
+        <p:cTn id="1" dur="indefinite" restart="never" nodeType="tmRoot">
+          <p:childTnLst>
+            <p:seq>
+              <p:cTn id="2" nodeType="mainSeq"/>
+              <p:prevCondLst>
+                <p:cond evt="onPrev" delay="0">
+                  <p:tgtEl>
+                    <p:sldTgt/>
+                  </p:tgtEl>
+                </p:cond>
+              </p:prevCondLst>
+              <p:nextCondLst>
+                <p:cond evt="onNext" delay="0">
+                  <p:tgtEl>
+                    <p:sldTgt/>
+                  </p:tgtEl>
+                </p:cond>
+              </p:nextCondLst>
+            </p:seq>
+          </p:childTnLst>
+        </p:cTn>
+      </p:par>
+    </p:tnLst>
+  </p:timing>
+</p:sld>
+</file>
+
+<file path=ppt/slides/slide29.xml><?xml version="1.0" encoding="utf-8"?>
+<p:sld xmlns:a="http://schemas.openxmlformats.org/drawingml/2006/main" xmlns:r="http://schemas.openxmlformats.org/officeDocument/2006/relationships" xmlns:p="http://schemas.openxmlformats.org/presentationml/2006/main">
+  <p:cSld>
+    <p:spTree>
+      <p:nvGrpSpPr>
+        <p:cNvPr id="1" name=""/>
+        <p:cNvGrpSpPr/>
+        <p:nvPr/>
+      </p:nvGrpSpPr>
+      <p:grpSpPr>
+        <a:xfrm>
+          <a:off x="0" y="0"/>
+          <a:ext cx="0" cy="0"/>
+          <a:chOff x="0" y="0"/>
+          <a:chExt cx="0" cy="0"/>
+        </a:xfrm>
+      </p:grpSpPr>
+      <p:sp>
+        <p:nvSpPr>
+          <p:cNvPr id="124" name="CustomShape 1"/>
+          <p:cNvSpPr/>
+          <p:nvPr/>
+        </p:nvSpPr>
+        <p:spPr>
+          <a:xfrm>
+            <a:off x="838080" y="365040"/>
+            <a:ext cx="10513440" cy="1323360"/>
+          </a:xfrm>
+          <a:prstGeom prst="rect">
+            <a:avLst/>
+          </a:prstGeom>
+          <a:noFill/>
+          <a:ln>
+            <a:noFill/>
+          </a:ln>
+        </p:spPr>
+        <p:txBody>
+          <a:bodyPr lIns="90000" tIns="45000" rIns="90000" bIns="45000" anchor="ctr"/>
+          <a:lstStyle/>
+          <a:p>
+            <a:pPr>
+              <a:lnSpc>
+                <a:spcPct val="90000"/>
+              </a:lnSpc>
+            </a:pPr>
+            <a:r>
+              <a:rPr lang="en-US" sz="4400" dirty="0" err="1">
+                <a:solidFill>
+                  <a:srgbClr val="000000"/>
+                </a:solidFill>
+                <a:latin typeface="Calibri Light"/>
+              </a:rPr>
+              <a:t>Visualização</a:t>
+            </a:r>
+            <a:r>
+              <a:rPr lang="en-US" sz="4400" dirty="0">
+                <a:solidFill>
+                  <a:srgbClr val="000000"/>
+                </a:solidFill>
+                <a:latin typeface="Calibri Light"/>
+              </a:rPr>
+              <a:t> de dados</a:t>
+            </a:r>
+            <a:endParaRPr dirty="0"/>
+          </a:p>
+        </p:txBody>
+      </p:sp>
+      <p:sp>
+        <p:nvSpPr>
+          <p:cNvPr id="3" name="Retângulo 2"/>
+          <p:cNvSpPr/>
+          <p:nvPr/>
+        </p:nvSpPr>
+        <p:spPr>
+          <a:xfrm>
+            <a:off x="838080" y="1688399"/>
+            <a:ext cx="9979975" cy="492443"/>
+          </a:xfrm>
+          <a:prstGeom prst="rect">
+            <a:avLst/>
+          </a:prstGeom>
+          <a:solidFill>
+            <a:schemeClr val="bg2"/>
+          </a:solidFill>
+          <a:ln cap="rnd">
+            <a:solidFill>
+              <a:schemeClr val="bg1">
+                <a:lumMod val="75000"/>
+              </a:schemeClr>
+            </a:solidFill>
+            <a:round/>
+          </a:ln>
+        </p:spPr>
+        <p:txBody>
+          <a:bodyPr wrap="square">
+            <a:spAutoFit/>
+          </a:bodyPr>
+          <a:lstStyle/>
+          <a:p>
+            <a:r>
+              <a:rPr lang="pt-BR" sz="2600" b="0" i="0" dirty="0" err="1">
+                <a:solidFill>
+                  <a:srgbClr val="333333"/>
+                </a:solidFill>
+                <a:effectLst/>
+                <a:latin typeface="Lucida Console" panose="020B0609040504020204" pitchFamily="49" charset="0"/>
+              </a:rPr>
+              <a:t>plt</a:t>
+            </a:r>
+            <a:r>
+              <a:rPr lang="pt-BR" sz="2600" b="0" i="0" dirty="0" err="1">
+                <a:solidFill>
+                  <a:srgbClr val="666666"/>
+                </a:solidFill>
+                <a:effectLst/>
+                <a:latin typeface="Lucida Console" panose="020B0609040504020204" pitchFamily="49" charset="0"/>
+              </a:rPr>
+              <a:t>.</a:t>
+            </a:r>
+            <a:r>
+              <a:rPr lang="pt-BR" sz="2600" dirty="0" err="1">
+                <a:solidFill>
+                  <a:srgbClr val="333333"/>
+                </a:solidFill>
+                <a:latin typeface="Lucida Console" panose="020B0609040504020204" pitchFamily="49" charset="0"/>
+              </a:rPr>
+              <a:t>xticks</a:t>
+            </a:r>
+            <a:r>
+              <a:rPr lang="pt-BR" sz="2600" b="0" i="0" dirty="0">
+                <a:solidFill>
+                  <a:srgbClr val="333333"/>
+                </a:solidFill>
+                <a:effectLst/>
+                <a:latin typeface="Lucida Console" panose="020B0609040504020204" pitchFamily="49" charset="0"/>
+              </a:rPr>
+              <a:t>(</a:t>
+            </a:r>
+            <a:r>
+              <a:rPr lang="pt-BR" sz="2600" b="0" i="0" dirty="0" err="1">
+                <a:solidFill>
+                  <a:srgbClr val="333333"/>
+                </a:solidFill>
+                <a:effectLst/>
+                <a:latin typeface="Lucida Console" panose="020B0609040504020204" pitchFamily="49" charset="0"/>
+              </a:rPr>
+              <a:t>np.arange</a:t>
+            </a:r>
+            <a:r>
+              <a:rPr lang="pt-BR" sz="2600" b="0" i="0" dirty="0">
+                <a:solidFill>
+                  <a:srgbClr val="333333"/>
+                </a:solidFill>
+                <a:effectLst/>
+                <a:latin typeface="Lucida Console" panose="020B0609040504020204" pitchFamily="49" charset="0"/>
+              </a:rPr>
+              <a:t>(</a:t>
+            </a:r>
+            <a:r>
+              <a:rPr lang="pt-BR" sz="2600" b="0" i="0" dirty="0" err="1">
+                <a:solidFill>
+                  <a:srgbClr val="333333"/>
+                </a:solidFill>
+                <a:effectLst/>
+                <a:latin typeface="Lucida Console" panose="020B0609040504020204" pitchFamily="49" charset="0"/>
+              </a:rPr>
+              <a:t>size</a:t>
+            </a:r>
+            <a:r>
+              <a:rPr lang="pt-BR" sz="2600" b="0" i="0" dirty="0">
+                <a:solidFill>
+                  <a:srgbClr val="333333"/>
+                </a:solidFill>
+                <a:effectLst/>
+                <a:latin typeface="Lucida Console" panose="020B0609040504020204" pitchFamily="49" charset="0"/>
+              </a:rPr>
+              <a:t>), xi)</a:t>
+            </a:r>
+          </a:p>
+        </p:txBody>
+      </p:sp>
+      <p:pic>
+        <p:nvPicPr>
+          <p:cNvPr id="2" name="Imagem 1"/>
+          <p:cNvPicPr>
+            <a:picLocks noChangeAspect="1"/>
+          </p:cNvPicPr>
+          <p:nvPr/>
+        </p:nvPicPr>
+        <p:blipFill>
+          <a:blip r:embed="rId2">
+            <a:extLst>
+              <a:ext uri="{28A0092B-C50C-407E-A947-70E740481C1C}">
+                <a14:useLocalDpi xmlns:a14="http://schemas.microsoft.com/office/drawing/2010/main" val="0"/>
+              </a:ext>
+            </a:extLst>
+          </a:blip>
+          <a:stretch>
+            <a:fillRect/>
+          </a:stretch>
+        </p:blipFill>
+        <p:spPr>
+          <a:xfrm>
+            <a:off x="2238103" y="1962694"/>
+            <a:ext cx="6527074" cy="4895306"/>
+          </a:xfrm>
+          <a:prstGeom prst="rect">
+            <a:avLst/>
+          </a:prstGeom>
+        </p:spPr>
+      </p:pic>
+    </p:spTree>
+    <p:extLst>
+      <p:ext uri="{BB962C8B-B14F-4D97-AF65-F5344CB8AC3E}">
+        <p14:creationId xmlns:p14="http://schemas.microsoft.com/office/powerpoint/2010/main" val="2771502643"/>
       </p:ext>
     </p:extLst>
   </p:cSld>
@@ -13900,6 +13911,259 @@
         </p:txBody>
       </p:sp>
     </p:spTree>
+  </p:cSld>
+  <p:clrMapOvr>
+    <a:masterClrMapping/>
+  </p:clrMapOvr>
+  <p:timing>
+    <p:tnLst>
+      <p:par>
+        <p:cTn id="1" dur="indefinite" restart="never" nodeType="tmRoot">
+          <p:childTnLst>
+            <p:seq>
+              <p:cTn id="2" nodeType="mainSeq"/>
+              <p:prevCondLst>
+                <p:cond evt="onPrev" delay="0">
+                  <p:tgtEl>
+                    <p:sldTgt/>
+                  </p:tgtEl>
+                </p:cond>
+              </p:prevCondLst>
+              <p:nextCondLst>
+                <p:cond evt="onNext" delay="0">
+                  <p:tgtEl>
+                    <p:sldTgt/>
+                  </p:tgtEl>
+                </p:cond>
+              </p:nextCondLst>
+            </p:seq>
+          </p:childTnLst>
+        </p:cTn>
+      </p:par>
+    </p:tnLst>
+  </p:timing>
+</p:sld>
+</file>
+
+<file path=ppt/slides/slide30.xml><?xml version="1.0" encoding="utf-8"?>
+<p:sld xmlns:a="http://schemas.openxmlformats.org/drawingml/2006/main" xmlns:r="http://schemas.openxmlformats.org/officeDocument/2006/relationships" xmlns:p="http://schemas.openxmlformats.org/presentationml/2006/main">
+  <p:cSld>
+    <p:spTree>
+      <p:nvGrpSpPr>
+        <p:cNvPr id="1" name=""/>
+        <p:cNvGrpSpPr/>
+        <p:nvPr/>
+      </p:nvGrpSpPr>
+      <p:grpSpPr>
+        <a:xfrm>
+          <a:off x="0" y="0"/>
+          <a:ext cx="0" cy="0"/>
+          <a:chOff x="0" y="0"/>
+          <a:chExt cx="0" cy="0"/>
+        </a:xfrm>
+      </p:grpSpPr>
+      <p:sp>
+        <p:nvSpPr>
+          <p:cNvPr id="124" name="CustomShape 1"/>
+          <p:cNvSpPr/>
+          <p:nvPr/>
+        </p:nvSpPr>
+        <p:spPr>
+          <a:xfrm>
+            <a:off x="838080" y="365040"/>
+            <a:ext cx="10513440" cy="1323360"/>
+          </a:xfrm>
+          <a:prstGeom prst="rect">
+            <a:avLst/>
+          </a:prstGeom>
+          <a:noFill/>
+          <a:ln>
+            <a:noFill/>
+          </a:ln>
+        </p:spPr>
+        <p:txBody>
+          <a:bodyPr lIns="90000" tIns="45000" rIns="90000" bIns="45000" anchor="ctr"/>
+          <a:lstStyle/>
+          <a:p>
+            <a:pPr>
+              <a:lnSpc>
+                <a:spcPct val="90000"/>
+              </a:lnSpc>
+            </a:pPr>
+            <a:r>
+              <a:rPr lang="en-US" sz="4400" dirty="0" err="1">
+                <a:solidFill>
+                  <a:srgbClr val="000000"/>
+                </a:solidFill>
+                <a:latin typeface="Calibri Light"/>
+              </a:rPr>
+              <a:t>Visualização</a:t>
+            </a:r>
+            <a:r>
+              <a:rPr lang="en-US" sz="4400" dirty="0">
+                <a:solidFill>
+                  <a:srgbClr val="000000"/>
+                </a:solidFill>
+                <a:latin typeface="Calibri Light"/>
+              </a:rPr>
+              <a:t> de dados</a:t>
+            </a:r>
+            <a:endParaRPr dirty="0"/>
+          </a:p>
+        </p:txBody>
+      </p:sp>
+      <p:sp>
+        <p:nvSpPr>
+          <p:cNvPr id="3" name="Retângulo 2"/>
+          <p:cNvSpPr/>
+          <p:nvPr/>
+        </p:nvSpPr>
+        <p:spPr>
+          <a:xfrm>
+            <a:off x="838080" y="1688399"/>
+            <a:ext cx="9979975" cy="492443"/>
+          </a:xfrm>
+          <a:prstGeom prst="rect">
+            <a:avLst/>
+          </a:prstGeom>
+          <a:solidFill>
+            <a:schemeClr val="bg2"/>
+          </a:solidFill>
+          <a:ln cap="rnd">
+            <a:solidFill>
+              <a:schemeClr val="bg1">
+                <a:lumMod val="75000"/>
+              </a:schemeClr>
+            </a:solidFill>
+            <a:round/>
+          </a:ln>
+        </p:spPr>
+        <p:txBody>
+          <a:bodyPr wrap="square">
+            <a:spAutoFit/>
+          </a:bodyPr>
+          <a:lstStyle/>
+          <a:p>
+            <a:r>
+              <a:rPr lang="pt-BR" sz="2600" b="0" i="0" dirty="0" err="1">
+                <a:solidFill>
+                  <a:srgbClr val="333333"/>
+                </a:solidFill>
+                <a:effectLst/>
+                <a:latin typeface="Lucida Console" panose="020B0609040504020204" pitchFamily="49" charset="0"/>
+              </a:rPr>
+              <a:t>plt</a:t>
+            </a:r>
+            <a:r>
+              <a:rPr lang="pt-BR" sz="2600" b="0" i="0" dirty="0" err="1">
+                <a:solidFill>
+                  <a:srgbClr val="666666"/>
+                </a:solidFill>
+                <a:effectLst/>
+                <a:latin typeface="Lucida Console" panose="020B0609040504020204" pitchFamily="49" charset="0"/>
+              </a:rPr>
+              <a:t>.</a:t>
+            </a:r>
+            <a:r>
+              <a:rPr lang="pt-BR" sz="2600" dirty="0" err="1">
+                <a:solidFill>
+                  <a:srgbClr val="333333"/>
+                </a:solidFill>
+                <a:latin typeface="Lucida Console" panose="020B0609040504020204" pitchFamily="49" charset="0"/>
+              </a:rPr>
+              <a:t>ylim</a:t>
+            </a:r>
+            <a:r>
+              <a:rPr lang="pt-BR" sz="2600" dirty="0">
+                <a:solidFill>
+                  <a:srgbClr val="333333"/>
+                </a:solidFill>
+                <a:latin typeface="Lucida Console" panose="020B0609040504020204" pitchFamily="49" charset="0"/>
+              </a:rPr>
+              <a:t>(0, </a:t>
+            </a:r>
+            <a:r>
+              <a:rPr lang="pt-BR" sz="2600" dirty="0" err="1">
+                <a:solidFill>
+                  <a:srgbClr val="008000"/>
+                </a:solidFill>
+                <a:latin typeface="Lucida Console" panose="020B0609040504020204" pitchFamily="49" charset="0"/>
+              </a:rPr>
+              <a:t>len</a:t>
+            </a:r>
+            <a:r>
+              <a:rPr lang="pt-BR" sz="2600" dirty="0">
+                <a:solidFill>
+                  <a:srgbClr val="333333"/>
+                </a:solidFill>
+                <a:latin typeface="Lucida Console" panose="020B0609040504020204" pitchFamily="49" charset="0"/>
+              </a:rPr>
+              <a:t>(</a:t>
+            </a:r>
+            <a:r>
+              <a:rPr lang="pt-BR" sz="2600" dirty="0" err="1">
+                <a:solidFill>
+                  <a:srgbClr val="333333"/>
+                </a:solidFill>
+                <a:latin typeface="Lucida Console" panose="020B0609040504020204" pitchFamily="49" charset="0"/>
+              </a:rPr>
+              <a:t>fi</a:t>
+            </a:r>
+            <a:r>
+              <a:rPr lang="pt-BR" sz="2600" dirty="0">
+                <a:solidFill>
+                  <a:srgbClr val="333333"/>
+                </a:solidFill>
+                <a:latin typeface="Lucida Console" panose="020B0609040504020204" pitchFamily="49" charset="0"/>
+              </a:rPr>
+              <a:t>) + 0.5)</a:t>
+            </a:r>
+            <a:endParaRPr lang="pt-BR" sz="2600" b="0" i="0" dirty="0">
+              <a:solidFill>
+                <a:srgbClr val="333333"/>
+              </a:solidFill>
+              <a:effectLst/>
+              <a:latin typeface="Lucida Console" panose="020B0609040504020204" pitchFamily="49" charset="0"/>
+            </a:endParaRPr>
+          </a:p>
+        </p:txBody>
+      </p:sp>
+      <p:pic>
+        <p:nvPicPr>
+          <p:cNvPr id="4" name="Imagem 3"/>
+          <p:cNvPicPr>
+            <a:picLocks noChangeAspect="1"/>
+          </p:cNvPicPr>
+          <p:nvPr/>
+        </p:nvPicPr>
+        <p:blipFill>
+          <a:blip r:embed="rId2">
+            <a:extLst>
+              <a:ext uri="{28A0092B-C50C-407E-A947-70E740481C1C}">
+                <a14:useLocalDpi xmlns:a14="http://schemas.microsoft.com/office/drawing/2010/main" val="0"/>
+              </a:ext>
+            </a:extLst>
+          </a:blip>
+          <a:stretch>
+            <a:fillRect/>
+          </a:stretch>
+        </p:blipFill>
+        <p:spPr>
+          <a:xfrm>
+            <a:off x="2780067" y="2286000"/>
+            <a:ext cx="6096000" cy="4572000"/>
+          </a:xfrm>
+          <a:prstGeom prst="rect">
+            <a:avLst/>
+          </a:prstGeom>
+        </p:spPr>
+      </p:pic>
+    </p:spTree>
+    <p:extLst>
+      <p:ext uri="{BB962C8B-B14F-4D97-AF65-F5344CB8AC3E}">
+        <p14:creationId xmlns:p14="http://schemas.microsoft.com/office/powerpoint/2010/main" val="1373888909"/>
+      </p:ext>
+    </p:extLst>
   </p:cSld>
   <p:clrMapOvr>
     <a:masterClrMapping/>

</xml_diff>